<commit_message>
add more in ppt
</commit_message>
<xml_diff>
--- a/report/Presentation.pptx
+++ b/report/Presentation.pptx
@@ -5,7 +5,7 @@
     <p:sldMasterId id="2147483660" r:id="rId1"/>
   </p:sldMasterIdLst>
   <p:notesMasterIdLst>
-    <p:notesMasterId r:id="rId14"/>
+    <p:notesMasterId r:id="rId17"/>
   </p:notesMasterIdLst>
   <p:sldIdLst>
     <p:sldId id="259" r:id="rId2"/>
@@ -16,10 +16,13 @@
     <p:sldId id="332" r:id="rId7"/>
     <p:sldId id="288" r:id="rId8"/>
     <p:sldId id="333" r:id="rId9"/>
-    <p:sldId id="334" r:id="rId10"/>
-    <p:sldId id="301" r:id="rId11"/>
-    <p:sldId id="310" r:id="rId12"/>
-    <p:sldId id="263" r:id="rId13"/>
+    <p:sldId id="335" r:id="rId10"/>
+    <p:sldId id="336" r:id="rId11"/>
+    <p:sldId id="337" r:id="rId12"/>
+    <p:sldId id="334" r:id="rId13"/>
+    <p:sldId id="301" r:id="rId14"/>
+    <p:sldId id="310" r:id="rId15"/>
+    <p:sldId id="263" r:id="rId16"/>
   </p:sldIdLst>
   <p:sldSz cx="9144000" cy="6858000" type="screen4x3"/>
   <p:notesSz cx="6858000" cy="9144000"/>
@@ -723,7 +726,7 @@
           <a:p>
             <a:fld id="{E26FB083-CA32-3048-9174-A27CEA96F0BA}" type="slidenum">
               <a:rPr kumimoji="1" lang="zh-CN" altLang="en-US" smtClean="0"/>
-              <a:t>10</a:t>
+              <a:t>13</a:t>
             </a:fld>
             <a:endParaRPr kumimoji="1" lang="zh-CN" altLang="en-US"/>
           </a:p>
@@ -3881,6 +3884,1997 @@
           <a:chExt cx="0" cy="0"/>
         </a:xfrm>
       </p:grpSpPr>
+      <p:sp>
+        <p:nvSpPr>
+          <p:cNvPr id="2" name="矩形 1"/>
+          <p:cNvSpPr/>
+          <p:nvPr/>
+        </p:nvSpPr>
+        <p:spPr>
+          <a:xfrm>
+            <a:off x="-1" y="1933497"/>
+            <a:ext cx="246280" cy="3124652"/>
+          </a:xfrm>
+          <a:prstGeom prst="rect">
+            <a:avLst/>
+          </a:prstGeom>
+          <a:solidFill>
+            <a:srgbClr val="84A2AA"/>
+          </a:solidFill>
+          <a:ln>
+            <a:noFill/>
+          </a:ln>
+        </p:spPr>
+        <p:style>
+          <a:lnRef idx="2">
+            <a:schemeClr val="accent1">
+              <a:shade val="50000"/>
+            </a:schemeClr>
+          </a:lnRef>
+          <a:fillRef idx="1">
+            <a:schemeClr val="accent1"/>
+          </a:fillRef>
+          <a:effectRef idx="0">
+            <a:schemeClr val="accent1"/>
+          </a:effectRef>
+          <a:fontRef idx="minor">
+            <a:schemeClr val="lt1"/>
+          </a:fontRef>
+        </p:style>
+        <p:txBody>
+          <a:bodyPr rtlCol="0" anchor="ctr"/>
+          <a:lstStyle/>
+          <a:p>
+            <a:pPr algn="ctr"/>
+            <a:endParaRPr lang="zh-CN" altLang="en-US" sz="1350"/>
+          </a:p>
+        </p:txBody>
+      </p:sp>
+      <p:sp>
+        <p:nvSpPr>
+          <p:cNvPr id="16" name="圆角矩形 15"/>
+          <p:cNvSpPr/>
+          <p:nvPr/>
+        </p:nvSpPr>
+        <p:spPr>
+          <a:xfrm>
+            <a:off x="591812" y="1933497"/>
+            <a:ext cx="114563" cy="603271"/>
+          </a:xfrm>
+          <a:prstGeom prst="roundRect">
+            <a:avLst/>
+          </a:prstGeom>
+          <a:solidFill>
+            <a:srgbClr val="9D9A88"/>
+          </a:solidFill>
+          <a:ln>
+            <a:noFill/>
+          </a:ln>
+        </p:spPr>
+        <p:style>
+          <a:lnRef idx="2">
+            <a:schemeClr val="accent1">
+              <a:shade val="50000"/>
+            </a:schemeClr>
+          </a:lnRef>
+          <a:fillRef idx="1">
+            <a:schemeClr val="accent1"/>
+          </a:fillRef>
+          <a:effectRef idx="0">
+            <a:schemeClr val="accent1"/>
+          </a:effectRef>
+          <a:fontRef idx="minor">
+            <a:schemeClr val="lt1"/>
+          </a:fontRef>
+        </p:style>
+        <p:txBody>
+          <a:bodyPr rtlCol="0" anchor="ctr"/>
+          <a:lstStyle/>
+          <a:p>
+            <a:pPr algn="ctr"/>
+            <a:endParaRPr lang="zh-CN" altLang="en-US" sz="1350">
+              <a:solidFill>
+                <a:srgbClr val="9D9A88"/>
+              </a:solidFill>
+            </a:endParaRPr>
+          </a:p>
+        </p:txBody>
+      </p:sp>
+      <p:sp>
+        <p:nvSpPr>
+          <p:cNvPr id="3" name="标题 1"/>
+          <p:cNvSpPr>
+            <a:spLocks noGrp="1"/>
+          </p:cNvSpPr>
+          <p:nvPr/>
+        </p:nvSpPr>
+        <p:spPr>
+          <a:xfrm>
+            <a:off x="473007" y="362609"/>
+            <a:ext cx="7886700" cy="994172"/>
+          </a:xfrm>
+          <a:prstGeom prst="rect">
+            <a:avLst/>
+          </a:prstGeom>
+        </p:spPr>
+        <p:txBody>
+          <a:bodyPr vert="horz" lIns="68580" tIns="34290" rIns="68580" bIns="34290" rtlCol="0" anchor="ctr">
+            <a:normAutofit/>
+          </a:bodyPr>
+          <a:lstStyle>
+            <a:lvl1pPr algn="l" defTabSz="914400" rtl="0" eaLnBrk="1" latinLnBrk="0" hangingPunct="1">
+              <a:lnSpc>
+                <a:spcPct val="90000"/>
+              </a:lnSpc>
+              <a:spcBef>
+                <a:spcPct val="0"/>
+              </a:spcBef>
+              <a:buNone/>
+              <a:defRPr sz="4400" kern="1200">
+                <a:solidFill>
+                  <a:schemeClr val="tx1"/>
+                </a:solidFill>
+                <a:latin typeface="+mj-lt"/>
+                <a:ea typeface="+mj-ea"/>
+                <a:cs typeface="+mj-cs"/>
+              </a:defRPr>
+            </a:lvl1pPr>
+          </a:lstStyle>
+          <a:p>
+            <a:r>
+              <a:rPr lang="en-US" altLang="zh-CN" sz="3000" dirty="0">
+                <a:solidFill>
+                  <a:srgbClr val="4D646F"/>
+                </a:solidFill>
+                <a:latin typeface="+mn-lt"/>
+                <a:ea typeface="+mn-ea"/>
+                <a:cs typeface="+mn-cs"/>
+              </a:rPr>
+              <a:t>Grammar analysis</a:t>
+            </a:r>
+          </a:p>
+        </p:txBody>
+      </p:sp>
+      <p:sp>
+        <p:nvSpPr>
+          <p:cNvPr id="8" name="内容占位符 2">
+            <a:extLst>
+              <a:ext uri="{FF2B5EF4-FFF2-40B4-BE49-F238E27FC236}">
+                <a16:creationId xmlns:a16="http://schemas.microsoft.com/office/drawing/2014/main" id="{9C66530C-5C53-4209-8CE1-C3EBE420C407}"/>
+              </a:ext>
+            </a:extLst>
+          </p:cNvPr>
+          <p:cNvSpPr>
+            <a:spLocks noGrp="1"/>
+          </p:cNvSpPr>
+          <p:nvPr/>
+        </p:nvSpPr>
+        <p:spPr>
+          <a:xfrm>
+            <a:off x="724746" y="1356781"/>
+            <a:ext cx="3751562" cy="2683591"/>
+          </a:xfrm>
+          <a:prstGeom prst="rect">
+            <a:avLst/>
+          </a:prstGeom>
+        </p:spPr>
+        <p:txBody>
+          <a:bodyPr vert="horz" lIns="68580" tIns="34290" rIns="68580" bIns="34290" rtlCol="0">
+            <a:normAutofit/>
+          </a:bodyPr>
+          <a:lstStyle>
+            <a:lvl1pPr marL="228600" indent="-228600" algn="l" defTabSz="914400" rtl="0" eaLnBrk="1" latinLnBrk="0" hangingPunct="1">
+              <a:lnSpc>
+                <a:spcPct val="90000"/>
+              </a:lnSpc>
+              <a:spcBef>
+                <a:spcPts val="1000"/>
+              </a:spcBef>
+              <a:buFont typeface="Arial" panose="020B0604020202020204" pitchFamily="34" charset="0"/>
+              <a:buChar char="•"/>
+              <a:defRPr sz="2800" kern="1200">
+                <a:solidFill>
+                  <a:schemeClr val="tx1"/>
+                </a:solidFill>
+                <a:latin typeface="+mn-lt"/>
+                <a:ea typeface="+mn-ea"/>
+                <a:cs typeface="+mn-cs"/>
+              </a:defRPr>
+            </a:lvl1pPr>
+            <a:lvl2pPr marL="685800" indent="-228600" algn="l" defTabSz="914400" rtl="0" eaLnBrk="1" latinLnBrk="0" hangingPunct="1">
+              <a:lnSpc>
+                <a:spcPct val="90000"/>
+              </a:lnSpc>
+              <a:spcBef>
+                <a:spcPts val="500"/>
+              </a:spcBef>
+              <a:buFont typeface="Arial" panose="020B0604020202020204" pitchFamily="34" charset="0"/>
+              <a:buChar char="•"/>
+              <a:defRPr sz="2400" kern="1200">
+                <a:solidFill>
+                  <a:schemeClr val="tx1"/>
+                </a:solidFill>
+                <a:latin typeface="+mn-lt"/>
+                <a:ea typeface="+mn-ea"/>
+                <a:cs typeface="+mn-cs"/>
+              </a:defRPr>
+            </a:lvl2pPr>
+            <a:lvl3pPr marL="1143000" indent="-228600" algn="l" defTabSz="914400" rtl="0" eaLnBrk="1" latinLnBrk="0" hangingPunct="1">
+              <a:lnSpc>
+                <a:spcPct val="90000"/>
+              </a:lnSpc>
+              <a:spcBef>
+                <a:spcPts val="500"/>
+              </a:spcBef>
+              <a:buFont typeface="Arial" panose="020B0604020202020204" pitchFamily="34" charset="0"/>
+              <a:buChar char="•"/>
+              <a:defRPr sz="2000" kern="1200">
+                <a:solidFill>
+                  <a:schemeClr val="tx1"/>
+                </a:solidFill>
+                <a:latin typeface="+mn-lt"/>
+                <a:ea typeface="+mn-ea"/>
+                <a:cs typeface="+mn-cs"/>
+              </a:defRPr>
+            </a:lvl3pPr>
+            <a:lvl4pPr marL="1600200" indent="-228600" algn="l" defTabSz="914400" rtl="0" eaLnBrk="1" latinLnBrk="0" hangingPunct="1">
+              <a:lnSpc>
+                <a:spcPct val="90000"/>
+              </a:lnSpc>
+              <a:spcBef>
+                <a:spcPts val="500"/>
+              </a:spcBef>
+              <a:buFont typeface="Arial" panose="020B0604020202020204" pitchFamily="34" charset="0"/>
+              <a:buChar char="•"/>
+              <a:defRPr sz="1800" kern="1200">
+                <a:solidFill>
+                  <a:schemeClr val="tx1"/>
+                </a:solidFill>
+                <a:latin typeface="+mn-lt"/>
+                <a:ea typeface="+mn-ea"/>
+                <a:cs typeface="+mn-cs"/>
+              </a:defRPr>
+            </a:lvl4pPr>
+            <a:lvl5pPr marL="2057400" indent="-228600" algn="l" defTabSz="914400" rtl="0" eaLnBrk="1" latinLnBrk="0" hangingPunct="1">
+              <a:lnSpc>
+                <a:spcPct val="90000"/>
+              </a:lnSpc>
+              <a:spcBef>
+                <a:spcPts val="500"/>
+              </a:spcBef>
+              <a:buFont typeface="Arial" panose="020B0604020202020204" pitchFamily="34" charset="0"/>
+              <a:buChar char="•"/>
+              <a:defRPr sz="1800" kern="1200">
+                <a:solidFill>
+                  <a:schemeClr val="tx1"/>
+                </a:solidFill>
+                <a:latin typeface="+mn-lt"/>
+                <a:ea typeface="+mn-ea"/>
+                <a:cs typeface="+mn-cs"/>
+              </a:defRPr>
+            </a:lvl5pPr>
+            <a:lvl6pPr marL="2514600" indent="-228600" algn="l" defTabSz="914400" rtl="0" eaLnBrk="1" latinLnBrk="0" hangingPunct="1">
+              <a:lnSpc>
+                <a:spcPct val="90000"/>
+              </a:lnSpc>
+              <a:spcBef>
+                <a:spcPts val="500"/>
+              </a:spcBef>
+              <a:buFont typeface="Arial" panose="020B0604020202020204" pitchFamily="34" charset="0"/>
+              <a:buChar char="•"/>
+              <a:defRPr sz="1800" kern="1200">
+                <a:solidFill>
+                  <a:schemeClr val="tx1"/>
+                </a:solidFill>
+                <a:latin typeface="+mn-lt"/>
+                <a:ea typeface="+mn-ea"/>
+                <a:cs typeface="+mn-cs"/>
+              </a:defRPr>
+            </a:lvl6pPr>
+            <a:lvl7pPr marL="2971800" indent="-228600" algn="l" defTabSz="914400" rtl="0" eaLnBrk="1" latinLnBrk="0" hangingPunct="1">
+              <a:lnSpc>
+                <a:spcPct val="90000"/>
+              </a:lnSpc>
+              <a:spcBef>
+                <a:spcPts val="500"/>
+              </a:spcBef>
+              <a:buFont typeface="Arial" panose="020B0604020202020204" pitchFamily="34" charset="0"/>
+              <a:buChar char="•"/>
+              <a:defRPr sz="1800" kern="1200">
+                <a:solidFill>
+                  <a:schemeClr val="tx1"/>
+                </a:solidFill>
+                <a:latin typeface="+mn-lt"/>
+                <a:ea typeface="+mn-ea"/>
+                <a:cs typeface="+mn-cs"/>
+              </a:defRPr>
+            </a:lvl7pPr>
+            <a:lvl8pPr marL="3429000" indent="-228600" algn="l" defTabSz="914400" rtl="0" eaLnBrk="1" latinLnBrk="0" hangingPunct="1">
+              <a:lnSpc>
+                <a:spcPct val="90000"/>
+              </a:lnSpc>
+              <a:spcBef>
+                <a:spcPts val="500"/>
+              </a:spcBef>
+              <a:buFont typeface="Arial" panose="020B0604020202020204" pitchFamily="34" charset="0"/>
+              <a:buChar char="•"/>
+              <a:defRPr sz="1800" kern="1200">
+                <a:solidFill>
+                  <a:schemeClr val="tx1"/>
+                </a:solidFill>
+                <a:latin typeface="+mn-lt"/>
+                <a:ea typeface="+mn-ea"/>
+                <a:cs typeface="+mn-cs"/>
+              </a:defRPr>
+            </a:lvl8pPr>
+            <a:lvl9pPr marL="3886200" indent="-228600" algn="l" defTabSz="914400" rtl="0" eaLnBrk="1" latinLnBrk="0" hangingPunct="1">
+              <a:lnSpc>
+                <a:spcPct val="90000"/>
+              </a:lnSpc>
+              <a:spcBef>
+                <a:spcPts val="500"/>
+              </a:spcBef>
+              <a:buFont typeface="Arial" panose="020B0604020202020204" pitchFamily="34" charset="0"/>
+              <a:buChar char="•"/>
+              <a:defRPr sz="1800" kern="1200">
+                <a:solidFill>
+                  <a:schemeClr val="tx1"/>
+                </a:solidFill>
+                <a:latin typeface="+mn-lt"/>
+                <a:ea typeface="+mn-ea"/>
+                <a:cs typeface="+mn-cs"/>
+              </a:defRPr>
+            </a:lvl9pPr>
+          </a:lstStyle>
+          <a:p>
+            <a:r>
+              <a:rPr lang="en-US" altLang="zh-CN" sz="2600" b="1" dirty="0">
+                <a:solidFill>
+                  <a:srgbClr val="4D646F"/>
+                </a:solidFill>
+              </a:rPr>
+              <a:t>Error handling Example</a:t>
+            </a:r>
+          </a:p>
+          <a:p>
+            <a:pPr marL="0" indent="0">
+              <a:buNone/>
+            </a:pPr>
+            <a:r>
+              <a:rPr lang="en-US" altLang="zh-CN" sz="1700" dirty="0">
+                <a:solidFill>
+                  <a:srgbClr val="4D646F"/>
+                </a:solidFill>
+              </a:rPr>
+              <a:t>type</a:t>
+            </a:r>
+          </a:p>
+          <a:p>
+            <a:pPr marL="0" indent="0">
+              <a:buNone/>
+            </a:pPr>
+            <a:r>
+              <a:rPr lang="en-US" altLang="zh-CN" sz="1700" dirty="0">
+                <a:solidFill>
+                  <a:srgbClr val="4D646F"/>
+                </a:solidFill>
+              </a:rPr>
+              <a:t>    </a:t>
+            </a:r>
+            <a:r>
+              <a:rPr lang="en-US" altLang="zh-CN" sz="1700" dirty="0" err="1">
+                <a:solidFill>
+                  <a:srgbClr val="4D646F"/>
+                </a:solidFill>
+              </a:rPr>
+              <a:t>arr</a:t>
+            </a:r>
+            <a:r>
+              <a:rPr lang="en-US" altLang="zh-CN" sz="1700" dirty="0">
+                <a:solidFill>
+                  <a:srgbClr val="4D646F"/>
+                </a:solidFill>
+              </a:rPr>
+              <a:t> = array [050] of integer;</a:t>
+            </a:r>
+          </a:p>
+          <a:p>
+            <a:pPr marL="0" indent="0">
+              <a:buNone/>
+            </a:pPr>
+            <a:r>
+              <a:rPr lang="en-US" altLang="zh-CN" sz="1700" dirty="0">
+                <a:solidFill>
+                  <a:srgbClr val="4D646F"/>
+                </a:solidFill>
+              </a:rPr>
+              <a:t>  	</a:t>
+            </a:r>
+            <a:r>
+              <a:rPr lang="en-US" altLang="zh-CN" sz="1700" dirty="0" err="1">
+                <a:solidFill>
+                  <a:srgbClr val="4D646F"/>
+                </a:solidFill>
+              </a:rPr>
+              <a:t>MailingListRecord</a:t>
+            </a:r>
+            <a:r>
+              <a:rPr lang="en-US" altLang="zh-CN" sz="1700" dirty="0">
+                <a:solidFill>
+                  <a:srgbClr val="4D646F"/>
+                </a:solidFill>
+              </a:rPr>
+              <a:t> = record</a:t>
+            </a:r>
+          </a:p>
+          <a:p>
+            <a:pPr marL="0" indent="0">
+              <a:buNone/>
+            </a:pPr>
+            <a:r>
+              <a:rPr lang="en-US" altLang="zh-CN" sz="1700" dirty="0">
+                <a:solidFill>
+                  <a:srgbClr val="4D646F"/>
+                </a:solidFill>
+              </a:rPr>
+              <a:t>    	FirstName: string;</a:t>
+            </a:r>
+          </a:p>
+          <a:p>
+            <a:pPr marL="0" indent="0">
+              <a:buNone/>
+            </a:pPr>
+            <a:r>
+              <a:rPr lang="en-US" altLang="zh-CN" sz="1700" dirty="0">
+                <a:solidFill>
+                  <a:srgbClr val="4D646F"/>
+                </a:solidFill>
+              </a:rPr>
+              <a:t>    	</a:t>
+            </a:r>
+            <a:r>
+              <a:rPr lang="en-US" altLang="zh-CN" sz="1700" dirty="0" err="1">
+                <a:solidFill>
+                  <a:srgbClr val="4D646F"/>
+                </a:solidFill>
+              </a:rPr>
+              <a:t>LastName</a:t>
+            </a:r>
+            <a:r>
+              <a:rPr lang="en-US" altLang="zh-CN" sz="1700" dirty="0">
+                <a:solidFill>
+                  <a:srgbClr val="4D646F"/>
+                </a:solidFill>
+              </a:rPr>
+              <a:t>: string;</a:t>
+            </a:r>
+          </a:p>
+          <a:p>
+            <a:pPr marL="0" indent="0">
+              <a:buNone/>
+            </a:pPr>
+            <a:r>
+              <a:rPr lang="en-US" altLang="zh-CN" sz="1700" dirty="0">
+                <a:solidFill>
+                  <a:srgbClr val="4D646F"/>
+                </a:solidFill>
+              </a:rPr>
+              <a:t>    	Address: string;</a:t>
+            </a:r>
+            <a:endParaRPr lang="en-US" altLang="zh-CN" sz="2100" b="1" dirty="0">
+              <a:solidFill>
+                <a:srgbClr val="4D646F"/>
+              </a:solidFill>
+            </a:endParaRPr>
+          </a:p>
+          <a:p>
+            <a:endParaRPr lang="en-US" altLang="zh-CN" sz="2100" b="1" dirty="0">
+              <a:solidFill>
+                <a:srgbClr val="4D646F"/>
+              </a:solidFill>
+            </a:endParaRPr>
+          </a:p>
+          <a:p>
+            <a:endParaRPr lang="en-US" altLang="zh-CN" sz="2100" b="1" dirty="0">
+              <a:solidFill>
+                <a:srgbClr val="4D646F"/>
+              </a:solidFill>
+            </a:endParaRPr>
+          </a:p>
+        </p:txBody>
+      </p:sp>
+      <p:sp>
+        <p:nvSpPr>
+          <p:cNvPr id="4" name="乘号 3">
+            <a:extLst>
+              <a:ext uri="{FF2B5EF4-FFF2-40B4-BE49-F238E27FC236}">
+                <a16:creationId xmlns:a16="http://schemas.microsoft.com/office/drawing/2014/main" id="{C63E7347-E255-485D-90D3-FF8E38909DFD}"/>
+              </a:ext>
+            </a:extLst>
+          </p:cNvPr>
+          <p:cNvSpPr/>
+          <p:nvPr/>
+        </p:nvSpPr>
+        <p:spPr>
+          <a:xfrm>
+            <a:off x="3211034" y="2126513"/>
+            <a:ext cx="765544" cy="410256"/>
+          </a:xfrm>
+          <a:prstGeom prst="mathMultiply">
+            <a:avLst/>
+          </a:prstGeom>
+          <a:solidFill>
+            <a:srgbClr val="FF5050"/>
+          </a:solidFill>
+        </p:spPr>
+        <p:style>
+          <a:lnRef idx="2">
+            <a:schemeClr val="accent1">
+              <a:shade val="50000"/>
+            </a:schemeClr>
+          </a:lnRef>
+          <a:fillRef idx="1">
+            <a:schemeClr val="accent1"/>
+          </a:fillRef>
+          <a:effectRef idx="0">
+            <a:schemeClr val="accent1"/>
+          </a:effectRef>
+          <a:fontRef idx="minor">
+            <a:schemeClr val="lt1"/>
+          </a:fontRef>
+        </p:style>
+        <p:txBody>
+          <a:bodyPr rtlCol="0" anchor="ctr"/>
+          <a:lstStyle/>
+          <a:p>
+            <a:pPr algn="ctr"/>
+            <a:endParaRPr lang="zh-CN" altLang="en-US"/>
+          </a:p>
+        </p:txBody>
+      </p:sp>
+      <p:pic>
+        <p:nvPicPr>
+          <p:cNvPr id="9" name="图片 8">
+            <a:extLst>
+              <a:ext uri="{FF2B5EF4-FFF2-40B4-BE49-F238E27FC236}">
+                <a16:creationId xmlns:a16="http://schemas.microsoft.com/office/drawing/2014/main" id="{B9570EBA-BCBA-4678-99CC-AF73EFC0F87B}"/>
+              </a:ext>
+            </a:extLst>
+          </p:cNvPr>
+          <p:cNvPicPr>
+            <a:picLocks noChangeAspect="1"/>
+          </p:cNvPicPr>
+          <p:nvPr/>
+        </p:nvPicPr>
+        <p:blipFill>
+          <a:blip r:embed="rId2">
+            <a:extLst>
+              <a:ext uri="{28A0092B-C50C-407E-A947-70E740481C1C}">
+                <a14:useLocalDpi xmlns:a14="http://schemas.microsoft.com/office/drawing/2010/main" val="0"/>
+              </a:ext>
+            </a:extLst>
+          </a:blip>
+          <a:stretch>
+            <a:fillRect/>
+          </a:stretch>
+        </p:blipFill>
+        <p:spPr>
+          <a:xfrm>
+            <a:off x="3840108" y="3306501"/>
+            <a:ext cx="4986787" cy="3057882"/>
+          </a:xfrm>
+          <a:prstGeom prst="rect">
+            <a:avLst/>
+          </a:prstGeom>
+        </p:spPr>
+      </p:pic>
+      <p:sp>
+        <p:nvSpPr>
+          <p:cNvPr id="10" name="内容占位符 2">
+            <a:extLst>
+              <a:ext uri="{FF2B5EF4-FFF2-40B4-BE49-F238E27FC236}">
+                <a16:creationId xmlns:a16="http://schemas.microsoft.com/office/drawing/2014/main" id="{C9EDD4B6-8CCF-4F4E-B8B5-8ABC53A0C797}"/>
+              </a:ext>
+            </a:extLst>
+          </p:cNvPr>
+          <p:cNvSpPr>
+            <a:spLocks noGrp="1"/>
+          </p:cNvSpPr>
+          <p:nvPr/>
+        </p:nvSpPr>
+        <p:spPr>
+          <a:xfrm>
+            <a:off x="1994376" y="5151150"/>
+            <a:ext cx="1658680" cy="419023"/>
+          </a:xfrm>
+          <a:prstGeom prst="rect">
+            <a:avLst/>
+          </a:prstGeom>
+        </p:spPr>
+        <p:txBody>
+          <a:bodyPr vert="horz" lIns="68580" tIns="34290" rIns="68580" bIns="34290" rtlCol="0">
+            <a:normAutofit/>
+          </a:bodyPr>
+          <a:lstStyle>
+            <a:lvl1pPr marL="228600" indent="-228600" algn="l" defTabSz="914400" rtl="0" eaLnBrk="1" latinLnBrk="0" hangingPunct="1">
+              <a:lnSpc>
+                <a:spcPct val="90000"/>
+              </a:lnSpc>
+              <a:spcBef>
+                <a:spcPts val="1000"/>
+              </a:spcBef>
+              <a:buFont typeface="Arial" panose="020B0604020202020204" pitchFamily="34" charset="0"/>
+              <a:buChar char="•"/>
+              <a:defRPr sz="2800" kern="1200">
+                <a:solidFill>
+                  <a:schemeClr val="tx1"/>
+                </a:solidFill>
+                <a:latin typeface="+mn-lt"/>
+                <a:ea typeface="+mn-ea"/>
+                <a:cs typeface="+mn-cs"/>
+              </a:defRPr>
+            </a:lvl1pPr>
+            <a:lvl2pPr marL="685800" indent="-228600" algn="l" defTabSz="914400" rtl="0" eaLnBrk="1" latinLnBrk="0" hangingPunct="1">
+              <a:lnSpc>
+                <a:spcPct val="90000"/>
+              </a:lnSpc>
+              <a:spcBef>
+                <a:spcPts val="500"/>
+              </a:spcBef>
+              <a:buFont typeface="Arial" panose="020B0604020202020204" pitchFamily="34" charset="0"/>
+              <a:buChar char="•"/>
+              <a:defRPr sz="2400" kern="1200">
+                <a:solidFill>
+                  <a:schemeClr val="tx1"/>
+                </a:solidFill>
+                <a:latin typeface="+mn-lt"/>
+                <a:ea typeface="+mn-ea"/>
+                <a:cs typeface="+mn-cs"/>
+              </a:defRPr>
+            </a:lvl2pPr>
+            <a:lvl3pPr marL="1143000" indent="-228600" algn="l" defTabSz="914400" rtl="0" eaLnBrk="1" latinLnBrk="0" hangingPunct="1">
+              <a:lnSpc>
+                <a:spcPct val="90000"/>
+              </a:lnSpc>
+              <a:spcBef>
+                <a:spcPts val="500"/>
+              </a:spcBef>
+              <a:buFont typeface="Arial" panose="020B0604020202020204" pitchFamily="34" charset="0"/>
+              <a:buChar char="•"/>
+              <a:defRPr sz="2000" kern="1200">
+                <a:solidFill>
+                  <a:schemeClr val="tx1"/>
+                </a:solidFill>
+                <a:latin typeface="+mn-lt"/>
+                <a:ea typeface="+mn-ea"/>
+                <a:cs typeface="+mn-cs"/>
+              </a:defRPr>
+            </a:lvl3pPr>
+            <a:lvl4pPr marL="1600200" indent="-228600" algn="l" defTabSz="914400" rtl="0" eaLnBrk="1" latinLnBrk="0" hangingPunct="1">
+              <a:lnSpc>
+                <a:spcPct val="90000"/>
+              </a:lnSpc>
+              <a:spcBef>
+                <a:spcPts val="500"/>
+              </a:spcBef>
+              <a:buFont typeface="Arial" panose="020B0604020202020204" pitchFamily="34" charset="0"/>
+              <a:buChar char="•"/>
+              <a:defRPr sz="1800" kern="1200">
+                <a:solidFill>
+                  <a:schemeClr val="tx1"/>
+                </a:solidFill>
+                <a:latin typeface="+mn-lt"/>
+                <a:ea typeface="+mn-ea"/>
+                <a:cs typeface="+mn-cs"/>
+              </a:defRPr>
+            </a:lvl4pPr>
+            <a:lvl5pPr marL="2057400" indent="-228600" algn="l" defTabSz="914400" rtl="0" eaLnBrk="1" latinLnBrk="0" hangingPunct="1">
+              <a:lnSpc>
+                <a:spcPct val="90000"/>
+              </a:lnSpc>
+              <a:spcBef>
+                <a:spcPts val="500"/>
+              </a:spcBef>
+              <a:buFont typeface="Arial" panose="020B0604020202020204" pitchFamily="34" charset="0"/>
+              <a:buChar char="•"/>
+              <a:defRPr sz="1800" kern="1200">
+                <a:solidFill>
+                  <a:schemeClr val="tx1"/>
+                </a:solidFill>
+                <a:latin typeface="+mn-lt"/>
+                <a:ea typeface="+mn-ea"/>
+                <a:cs typeface="+mn-cs"/>
+              </a:defRPr>
+            </a:lvl5pPr>
+            <a:lvl6pPr marL="2514600" indent="-228600" algn="l" defTabSz="914400" rtl="0" eaLnBrk="1" latinLnBrk="0" hangingPunct="1">
+              <a:lnSpc>
+                <a:spcPct val="90000"/>
+              </a:lnSpc>
+              <a:spcBef>
+                <a:spcPts val="500"/>
+              </a:spcBef>
+              <a:buFont typeface="Arial" panose="020B0604020202020204" pitchFamily="34" charset="0"/>
+              <a:buChar char="•"/>
+              <a:defRPr sz="1800" kern="1200">
+                <a:solidFill>
+                  <a:schemeClr val="tx1"/>
+                </a:solidFill>
+                <a:latin typeface="+mn-lt"/>
+                <a:ea typeface="+mn-ea"/>
+                <a:cs typeface="+mn-cs"/>
+              </a:defRPr>
+            </a:lvl6pPr>
+            <a:lvl7pPr marL="2971800" indent="-228600" algn="l" defTabSz="914400" rtl="0" eaLnBrk="1" latinLnBrk="0" hangingPunct="1">
+              <a:lnSpc>
+                <a:spcPct val="90000"/>
+              </a:lnSpc>
+              <a:spcBef>
+                <a:spcPts val="500"/>
+              </a:spcBef>
+              <a:buFont typeface="Arial" panose="020B0604020202020204" pitchFamily="34" charset="0"/>
+              <a:buChar char="•"/>
+              <a:defRPr sz="1800" kern="1200">
+                <a:solidFill>
+                  <a:schemeClr val="tx1"/>
+                </a:solidFill>
+                <a:latin typeface="+mn-lt"/>
+                <a:ea typeface="+mn-ea"/>
+                <a:cs typeface="+mn-cs"/>
+              </a:defRPr>
+            </a:lvl7pPr>
+            <a:lvl8pPr marL="3429000" indent="-228600" algn="l" defTabSz="914400" rtl="0" eaLnBrk="1" latinLnBrk="0" hangingPunct="1">
+              <a:lnSpc>
+                <a:spcPct val="90000"/>
+              </a:lnSpc>
+              <a:spcBef>
+                <a:spcPts val="500"/>
+              </a:spcBef>
+              <a:buFont typeface="Arial" panose="020B0604020202020204" pitchFamily="34" charset="0"/>
+              <a:buChar char="•"/>
+              <a:defRPr sz="1800" kern="1200">
+                <a:solidFill>
+                  <a:schemeClr val="tx1"/>
+                </a:solidFill>
+                <a:latin typeface="+mn-lt"/>
+                <a:ea typeface="+mn-ea"/>
+                <a:cs typeface="+mn-cs"/>
+              </a:defRPr>
+            </a:lvl8pPr>
+            <a:lvl9pPr marL="3886200" indent="-228600" algn="l" defTabSz="914400" rtl="0" eaLnBrk="1" latinLnBrk="0" hangingPunct="1">
+              <a:lnSpc>
+                <a:spcPct val="90000"/>
+              </a:lnSpc>
+              <a:spcBef>
+                <a:spcPts val="500"/>
+              </a:spcBef>
+              <a:buFont typeface="Arial" panose="020B0604020202020204" pitchFamily="34" charset="0"/>
+              <a:buChar char="•"/>
+              <a:defRPr sz="1800" kern="1200">
+                <a:solidFill>
+                  <a:schemeClr val="tx1"/>
+                </a:solidFill>
+                <a:latin typeface="+mn-lt"/>
+                <a:ea typeface="+mn-ea"/>
+                <a:cs typeface="+mn-cs"/>
+              </a:defRPr>
+            </a:lvl9pPr>
+          </a:lstStyle>
+          <a:p>
+            <a:pPr marL="0" indent="0">
+              <a:buNone/>
+            </a:pPr>
+            <a:r>
+              <a:rPr lang="en-US" altLang="zh-CN" sz="2100" b="1" dirty="0">
+                <a:solidFill>
+                  <a:srgbClr val="4D646F"/>
+                </a:solidFill>
+              </a:rPr>
+              <a:t>Panic mode</a:t>
+            </a:r>
+          </a:p>
+        </p:txBody>
+      </p:sp>
+      <p:sp>
+        <p:nvSpPr>
+          <p:cNvPr id="11" name="圆角矩形 15">
+            <a:extLst>
+              <a:ext uri="{FF2B5EF4-FFF2-40B4-BE49-F238E27FC236}">
+                <a16:creationId xmlns:a16="http://schemas.microsoft.com/office/drawing/2014/main" id="{AD629456-D505-4713-A776-BF58D3E1ACB3}"/>
+              </a:ext>
+            </a:extLst>
+          </p:cNvPr>
+          <p:cNvSpPr/>
+          <p:nvPr/>
+        </p:nvSpPr>
+        <p:spPr>
+          <a:xfrm>
+            <a:off x="1680395" y="5041068"/>
+            <a:ext cx="114563" cy="603271"/>
+          </a:xfrm>
+          <a:prstGeom prst="roundRect">
+            <a:avLst/>
+          </a:prstGeom>
+          <a:solidFill>
+            <a:srgbClr val="9D9A88"/>
+          </a:solidFill>
+          <a:ln>
+            <a:noFill/>
+          </a:ln>
+        </p:spPr>
+        <p:style>
+          <a:lnRef idx="2">
+            <a:schemeClr val="accent1">
+              <a:shade val="50000"/>
+            </a:schemeClr>
+          </a:lnRef>
+          <a:fillRef idx="1">
+            <a:schemeClr val="accent1"/>
+          </a:fillRef>
+          <a:effectRef idx="0">
+            <a:schemeClr val="accent1"/>
+          </a:effectRef>
+          <a:fontRef idx="minor">
+            <a:schemeClr val="lt1"/>
+          </a:fontRef>
+        </p:style>
+        <p:txBody>
+          <a:bodyPr rtlCol="0" anchor="ctr"/>
+          <a:lstStyle/>
+          <a:p>
+            <a:pPr algn="ctr"/>
+            <a:endParaRPr lang="zh-CN" altLang="en-US" sz="1350">
+              <a:solidFill>
+                <a:srgbClr val="9D9A88"/>
+              </a:solidFill>
+            </a:endParaRPr>
+          </a:p>
+        </p:txBody>
+      </p:sp>
+    </p:spTree>
+    <p:extLst>
+      <p:ext uri="{BB962C8B-B14F-4D97-AF65-F5344CB8AC3E}">
+        <p14:creationId xmlns:p14="http://schemas.microsoft.com/office/powerpoint/2010/main" val="1141640707"/>
+      </p:ext>
+    </p:extLst>
+  </p:cSld>
+  <p:clrMapOvr>
+    <a:masterClrMapping/>
+  </p:clrMapOvr>
+</p:sld>
+</file>
+
+<file path=ppt/slides/slide11.xml><?xml version="1.0" encoding="utf-8"?>
+<p:sld xmlns:a="http://schemas.openxmlformats.org/drawingml/2006/main" xmlns:r="http://schemas.openxmlformats.org/officeDocument/2006/relationships" xmlns:p="http://schemas.openxmlformats.org/presentationml/2006/main">
+  <p:cSld>
+    <p:spTree>
+      <p:nvGrpSpPr>
+        <p:cNvPr id="1" name=""/>
+        <p:cNvGrpSpPr/>
+        <p:nvPr/>
+      </p:nvGrpSpPr>
+      <p:grpSpPr>
+        <a:xfrm>
+          <a:off x="0" y="0"/>
+          <a:ext cx="0" cy="0"/>
+          <a:chOff x="0" y="0"/>
+          <a:chExt cx="0" cy="0"/>
+        </a:xfrm>
+      </p:grpSpPr>
+      <p:sp>
+        <p:nvSpPr>
+          <p:cNvPr id="2" name="矩形 1"/>
+          <p:cNvSpPr/>
+          <p:nvPr/>
+        </p:nvSpPr>
+        <p:spPr>
+          <a:xfrm>
+            <a:off x="-1" y="1933497"/>
+            <a:ext cx="246280" cy="3124652"/>
+          </a:xfrm>
+          <a:prstGeom prst="rect">
+            <a:avLst/>
+          </a:prstGeom>
+          <a:solidFill>
+            <a:srgbClr val="84A2AA"/>
+          </a:solidFill>
+          <a:ln>
+            <a:noFill/>
+          </a:ln>
+        </p:spPr>
+        <p:style>
+          <a:lnRef idx="2">
+            <a:schemeClr val="accent1">
+              <a:shade val="50000"/>
+            </a:schemeClr>
+          </a:lnRef>
+          <a:fillRef idx="1">
+            <a:schemeClr val="accent1"/>
+          </a:fillRef>
+          <a:effectRef idx="0">
+            <a:schemeClr val="accent1"/>
+          </a:effectRef>
+          <a:fontRef idx="minor">
+            <a:schemeClr val="lt1"/>
+          </a:fontRef>
+        </p:style>
+        <p:txBody>
+          <a:bodyPr rtlCol="0" anchor="ctr"/>
+          <a:lstStyle/>
+          <a:p>
+            <a:pPr algn="ctr"/>
+            <a:endParaRPr lang="zh-CN" altLang="en-US" sz="1350"/>
+          </a:p>
+        </p:txBody>
+      </p:sp>
+      <p:sp>
+        <p:nvSpPr>
+          <p:cNvPr id="16" name="圆角矩形 15"/>
+          <p:cNvSpPr/>
+          <p:nvPr/>
+        </p:nvSpPr>
+        <p:spPr>
+          <a:xfrm>
+            <a:off x="591812" y="1535719"/>
+            <a:ext cx="114563" cy="603271"/>
+          </a:xfrm>
+          <a:prstGeom prst="roundRect">
+            <a:avLst/>
+          </a:prstGeom>
+          <a:solidFill>
+            <a:srgbClr val="9D9A88"/>
+          </a:solidFill>
+          <a:ln>
+            <a:noFill/>
+          </a:ln>
+        </p:spPr>
+        <p:style>
+          <a:lnRef idx="2">
+            <a:schemeClr val="accent1">
+              <a:shade val="50000"/>
+            </a:schemeClr>
+          </a:lnRef>
+          <a:fillRef idx="1">
+            <a:schemeClr val="accent1"/>
+          </a:fillRef>
+          <a:effectRef idx="0">
+            <a:schemeClr val="accent1"/>
+          </a:effectRef>
+          <a:fontRef idx="minor">
+            <a:schemeClr val="lt1"/>
+          </a:fontRef>
+        </p:style>
+        <p:txBody>
+          <a:bodyPr rtlCol="0" anchor="ctr"/>
+          <a:lstStyle/>
+          <a:p>
+            <a:pPr algn="ctr"/>
+            <a:endParaRPr lang="zh-CN" altLang="en-US" sz="1350">
+              <a:solidFill>
+                <a:srgbClr val="9D9A88"/>
+              </a:solidFill>
+            </a:endParaRPr>
+          </a:p>
+        </p:txBody>
+      </p:sp>
+      <p:sp>
+        <p:nvSpPr>
+          <p:cNvPr id="3" name="标题 1"/>
+          <p:cNvSpPr>
+            <a:spLocks noGrp="1"/>
+          </p:cNvSpPr>
+          <p:nvPr/>
+        </p:nvSpPr>
+        <p:spPr>
+          <a:xfrm>
+            <a:off x="532958" y="116522"/>
+            <a:ext cx="7886700" cy="994172"/>
+          </a:xfrm>
+          <a:prstGeom prst="rect">
+            <a:avLst/>
+          </a:prstGeom>
+        </p:spPr>
+        <p:txBody>
+          <a:bodyPr vert="horz" lIns="68580" tIns="34290" rIns="68580" bIns="34290" rtlCol="0" anchor="ctr">
+            <a:normAutofit/>
+          </a:bodyPr>
+          <a:lstStyle>
+            <a:lvl1pPr algn="l" defTabSz="914400" rtl="0" eaLnBrk="1" latinLnBrk="0" hangingPunct="1">
+              <a:lnSpc>
+                <a:spcPct val="90000"/>
+              </a:lnSpc>
+              <a:spcBef>
+                <a:spcPct val="0"/>
+              </a:spcBef>
+              <a:buNone/>
+              <a:defRPr sz="4400" kern="1200">
+                <a:solidFill>
+                  <a:schemeClr val="tx1"/>
+                </a:solidFill>
+                <a:latin typeface="+mj-lt"/>
+                <a:ea typeface="+mj-ea"/>
+                <a:cs typeface="+mj-cs"/>
+              </a:defRPr>
+            </a:lvl1pPr>
+          </a:lstStyle>
+          <a:p>
+            <a:r>
+              <a:rPr lang="en-US" altLang="zh-CN" sz="3000" dirty="0">
+                <a:solidFill>
+                  <a:srgbClr val="4D646F"/>
+                </a:solidFill>
+                <a:latin typeface="+mn-lt"/>
+                <a:ea typeface="+mn-ea"/>
+                <a:cs typeface="+mn-cs"/>
+              </a:rPr>
+              <a:t>Grammar analysis</a:t>
+            </a:r>
+          </a:p>
+        </p:txBody>
+      </p:sp>
+      <p:sp>
+        <p:nvSpPr>
+          <p:cNvPr id="8" name="内容占位符 2">
+            <a:extLst>
+              <a:ext uri="{FF2B5EF4-FFF2-40B4-BE49-F238E27FC236}">
+                <a16:creationId xmlns:a16="http://schemas.microsoft.com/office/drawing/2014/main" id="{9C66530C-5C53-4209-8CE1-C3EBE420C407}"/>
+              </a:ext>
+            </a:extLst>
+          </p:cNvPr>
+          <p:cNvSpPr>
+            <a:spLocks noGrp="1"/>
+          </p:cNvSpPr>
+          <p:nvPr/>
+        </p:nvSpPr>
+        <p:spPr>
+          <a:xfrm>
+            <a:off x="591812" y="927944"/>
+            <a:ext cx="3751562" cy="410256"/>
+          </a:xfrm>
+          <a:prstGeom prst="rect">
+            <a:avLst/>
+          </a:prstGeom>
+        </p:spPr>
+        <p:txBody>
+          <a:bodyPr vert="horz" lIns="68580" tIns="34290" rIns="68580" bIns="34290" rtlCol="0">
+            <a:normAutofit lnSpcReduction="10000"/>
+          </a:bodyPr>
+          <a:lstStyle>
+            <a:lvl1pPr marL="228600" indent="-228600" algn="l" defTabSz="914400" rtl="0" eaLnBrk="1" latinLnBrk="0" hangingPunct="1">
+              <a:lnSpc>
+                <a:spcPct val="90000"/>
+              </a:lnSpc>
+              <a:spcBef>
+                <a:spcPts val="1000"/>
+              </a:spcBef>
+              <a:buFont typeface="Arial" panose="020B0604020202020204" pitchFamily="34" charset="0"/>
+              <a:buChar char="•"/>
+              <a:defRPr sz="2800" kern="1200">
+                <a:solidFill>
+                  <a:schemeClr val="tx1"/>
+                </a:solidFill>
+                <a:latin typeface="+mn-lt"/>
+                <a:ea typeface="+mn-ea"/>
+                <a:cs typeface="+mn-cs"/>
+              </a:defRPr>
+            </a:lvl1pPr>
+            <a:lvl2pPr marL="685800" indent="-228600" algn="l" defTabSz="914400" rtl="0" eaLnBrk="1" latinLnBrk="0" hangingPunct="1">
+              <a:lnSpc>
+                <a:spcPct val="90000"/>
+              </a:lnSpc>
+              <a:spcBef>
+                <a:spcPts val="500"/>
+              </a:spcBef>
+              <a:buFont typeface="Arial" panose="020B0604020202020204" pitchFamily="34" charset="0"/>
+              <a:buChar char="•"/>
+              <a:defRPr sz="2400" kern="1200">
+                <a:solidFill>
+                  <a:schemeClr val="tx1"/>
+                </a:solidFill>
+                <a:latin typeface="+mn-lt"/>
+                <a:ea typeface="+mn-ea"/>
+                <a:cs typeface="+mn-cs"/>
+              </a:defRPr>
+            </a:lvl2pPr>
+            <a:lvl3pPr marL="1143000" indent="-228600" algn="l" defTabSz="914400" rtl="0" eaLnBrk="1" latinLnBrk="0" hangingPunct="1">
+              <a:lnSpc>
+                <a:spcPct val="90000"/>
+              </a:lnSpc>
+              <a:spcBef>
+                <a:spcPts val="500"/>
+              </a:spcBef>
+              <a:buFont typeface="Arial" panose="020B0604020202020204" pitchFamily="34" charset="0"/>
+              <a:buChar char="•"/>
+              <a:defRPr sz="2000" kern="1200">
+                <a:solidFill>
+                  <a:schemeClr val="tx1"/>
+                </a:solidFill>
+                <a:latin typeface="+mn-lt"/>
+                <a:ea typeface="+mn-ea"/>
+                <a:cs typeface="+mn-cs"/>
+              </a:defRPr>
+            </a:lvl3pPr>
+            <a:lvl4pPr marL="1600200" indent="-228600" algn="l" defTabSz="914400" rtl="0" eaLnBrk="1" latinLnBrk="0" hangingPunct="1">
+              <a:lnSpc>
+                <a:spcPct val="90000"/>
+              </a:lnSpc>
+              <a:spcBef>
+                <a:spcPts val="500"/>
+              </a:spcBef>
+              <a:buFont typeface="Arial" panose="020B0604020202020204" pitchFamily="34" charset="0"/>
+              <a:buChar char="•"/>
+              <a:defRPr sz="1800" kern="1200">
+                <a:solidFill>
+                  <a:schemeClr val="tx1"/>
+                </a:solidFill>
+                <a:latin typeface="+mn-lt"/>
+                <a:ea typeface="+mn-ea"/>
+                <a:cs typeface="+mn-cs"/>
+              </a:defRPr>
+            </a:lvl4pPr>
+            <a:lvl5pPr marL="2057400" indent="-228600" algn="l" defTabSz="914400" rtl="0" eaLnBrk="1" latinLnBrk="0" hangingPunct="1">
+              <a:lnSpc>
+                <a:spcPct val="90000"/>
+              </a:lnSpc>
+              <a:spcBef>
+                <a:spcPts val="500"/>
+              </a:spcBef>
+              <a:buFont typeface="Arial" panose="020B0604020202020204" pitchFamily="34" charset="0"/>
+              <a:buChar char="•"/>
+              <a:defRPr sz="1800" kern="1200">
+                <a:solidFill>
+                  <a:schemeClr val="tx1"/>
+                </a:solidFill>
+                <a:latin typeface="+mn-lt"/>
+                <a:ea typeface="+mn-ea"/>
+                <a:cs typeface="+mn-cs"/>
+              </a:defRPr>
+            </a:lvl5pPr>
+            <a:lvl6pPr marL="2514600" indent="-228600" algn="l" defTabSz="914400" rtl="0" eaLnBrk="1" latinLnBrk="0" hangingPunct="1">
+              <a:lnSpc>
+                <a:spcPct val="90000"/>
+              </a:lnSpc>
+              <a:spcBef>
+                <a:spcPts val="500"/>
+              </a:spcBef>
+              <a:buFont typeface="Arial" panose="020B0604020202020204" pitchFamily="34" charset="0"/>
+              <a:buChar char="•"/>
+              <a:defRPr sz="1800" kern="1200">
+                <a:solidFill>
+                  <a:schemeClr val="tx1"/>
+                </a:solidFill>
+                <a:latin typeface="+mn-lt"/>
+                <a:ea typeface="+mn-ea"/>
+                <a:cs typeface="+mn-cs"/>
+              </a:defRPr>
+            </a:lvl6pPr>
+            <a:lvl7pPr marL="2971800" indent="-228600" algn="l" defTabSz="914400" rtl="0" eaLnBrk="1" latinLnBrk="0" hangingPunct="1">
+              <a:lnSpc>
+                <a:spcPct val="90000"/>
+              </a:lnSpc>
+              <a:spcBef>
+                <a:spcPts val="500"/>
+              </a:spcBef>
+              <a:buFont typeface="Arial" panose="020B0604020202020204" pitchFamily="34" charset="0"/>
+              <a:buChar char="•"/>
+              <a:defRPr sz="1800" kern="1200">
+                <a:solidFill>
+                  <a:schemeClr val="tx1"/>
+                </a:solidFill>
+                <a:latin typeface="+mn-lt"/>
+                <a:ea typeface="+mn-ea"/>
+                <a:cs typeface="+mn-cs"/>
+              </a:defRPr>
+            </a:lvl7pPr>
+            <a:lvl8pPr marL="3429000" indent="-228600" algn="l" defTabSz="914400" rtl="0" eaLnBrk="1" latinLnBrk="0" hangingPunct="1">
+              <a:lnSpc>
+                <a:spcPct val="90000"/>
+              </a:lnSpc>
+              <a:spcBef>
+                <a:spcPts val="500"/>
+              </a:spcBef>
+              <a:buFont typeface="Arial" panose="020B0604020202020204" pitchFamily="34" charset="0"/>
+              <a:buChar char="•"/>
+              <a:defRPr sz="1800" kern="1200">
+                <a:solidFill>
+                  <a:schemeClr val="tx1"/>
+                </a:solidFill>
+                <a:latin typeface="+mn-lt"/>
+                <a:ea typeface="+mn-ea"/>
+                <a:cs typeface="+mn-cs"/>
+              </a:defRPr>
+            </a:lvl8pPr>
+            <a:lvl9pPr marL="3886200" indent="-228600" algn="l" defTabSz="914400" rtl="0" eaLnBrk="1" latinLnBrk="0" hangingPunct="1">
+              <a:lnSpc>
+                <a:spcPct val="90000"/>
+              </a:lnSpc>
+              <a:spcBef>
+                <a:spcPts val="500"/>
+              </a:spcBef>
+              <a:buFont typeface="Arial" panose="020B0604020202020204" pitchFamily="34" charset="0"/>
+              <a:buChar char="•"/>
+              <a:defRPr sz="1800" kern="1200">
+                <a:solidFill>
+                  <a:schemeClr val="tx1"/>
+                </a:solidFill>
+                <a:latin typeface="+mn-lt"/>
+                <a:ea typeface="+mn-ea"/>
+                <a:cs typeface="+mn-cs"/>
+              </a:defRPr>
+            </a:lvl9pPr>
+          </a:lstStyle>
+          <a:p>
+            <a:r>
+              <a:rPr lang="en-US" altLang="zh-CN" sz="2600" b="1" dirty="0">
+                <a:solidFill>
+                  <a:srgbClr val="4D646F"/>
+                </a:solidFill>
+              </a:rPr>
+              <a:t>Error handling Example</a:t>
+            </a:r>
+          </a:p>
+          <a:p>
+            <a:endParaRPr lang="en-US" altLang="zh-CN" sz="2100" b="1" dirty="0">
+              <a:solidFill>
+                <a:srgbClr val="4D646F"/>
+              </a:solidFill>
+            </a:endParaRPr>
+          </a:p>
+          <a:p>
+            <a:endParaRPr lang="en-US" altLang="zh-CN" sz="2100" b="1" dirty="0">
+              <a:solidFill>
+                <a:srgbClr val="4D646F"/>
+              </a:solidFill>
+            </a:endParaRPr>
+          </a:p>
+        </p:txBody>
+      </p:sp>
+      <p:sp>
+        <p:nvSpPr>
+          <p:cNvPr id="9" name="内容占位符 2">
+            <a:extLst>
+              <a:ext uri="{FF2B5EF4-FFF2-40B4-BE49-F238E27FC236}">
+                <a16:creationId xmlns:a16="http://schemas.microsoft.com/office/drawing/2014/main" id="{F75798BC-2298-4BC9-A03D-BDAF3A33F830}"/>
+              </a:ext>
+            </a:extLst>
+          </p:cNvPr>
+          <p:cNvSpPr>
+            <a:spLocks noGrp="1"/>
+          </p:cNvSpPr>
+          <p:nvPr/>
+        </p:nvSpPr>
+        <p:spPr>
+          <a:xfrm>
+            <a:off x="852336" y="1468678"/>
+            <a:ext cx="2369329" cy="410256"/>
+          </a:xfrm>
+          <a:prstGeom prst="rect">
+            <a:avLst/>
+          </a:prstGeom>
+        </p:spPr>
+        <p:txBody>
+          <a:bodyPr vert="horz" lIns="68580" tIns="34290" rIns="68580" bIns="34290" rtlCol="0">
+            <a:normAutofit/>
+          </a:bodyPr>
+          <a:lstStyle>
+            <a:lvl1pPr marL="228600" indent="-228600" algn="l" defTabSz="914400" rtl="0" eaLnBrk="1" latinLnBrk="0" hangingPunct="1">
+              <a:lnSpc>
+                <a:spcPct val="90000"/>
+              </a:lnSpc>
+              <a:spcBef>
+                <a:spcPts val="1000"/>
+              </a:spcBef>
+              <a:buFont typeface="Arial" panose="020B0604020202020204" pitchFamily="34" charset="0"/>
+              <a:buChar char="•"/>
+              <a:defRPr sz="2800" kern="1200">
+                <a:solidFill>
+                  <a:schemeClr val="tx1"/>
+                </a:solidFill>
+                <a:latin typeface="+mn-lt"/>
+                <a:ea typeface="+mn-ea"/>
+                <a:cs typeface="+mn-cs"/>
+              </a:defRPr>
+            </a:lvl1pPr>
+            <a:lvl2pPr marL="685800" indent="-228600" algn="l" defTabSz="914400" rtl="0" eaLnBrk="1" latinLnBrk="0" hangingPunct="1">
+              <a:lnSpc>
+                <a:spcPct val="90000"/>
+              </a:lnSpc>
+              <a:spcBef>
+                <a:spcPts val="500"/>
+              </a:spcBef>
+              <a:buFont typeface="Arial" panose="020B0604020202020204" pitchFamily="34" charset="0"/>
+              <a:buChar char="•"/>
+              <a:defRPr sz="2400" kern="1200">
+                <a:solidFill>
+                  <a:schemeClr val="tx1"/>
+                </a:solidFill>
+                <a:latin typeface="+mn-lt"/>
+                <a:ea typeface="+mn-ea"/>
+                <a:cs typeface="+mn-cs"/>
+              </a:defRPr>
+            </a:lvl2pPr>
+            <a:lvl3pPr marL="1143000" indent="-228600" algn="l" defTabSz="914400" rtl="0" eaLnBrk="1" latinLnBrk="0" hangingPunct="1">
+              <a:lnSpc>
+                <a:spcPct val="90000"/>
+              </a:lnSpc>
+              <a:spcBef>
+                <a:spcPts val="500"/>
+              </a:spcBef>
+              <a:buFont typeface="Arial" panose="020B0604020202020204" pitchFamily="34" charset="0"/>
+              <a:buChar char="•"/>
+              <a:defRPr sz="2000" kern="1200">
+                <a:solidFill>
+                  <a:schemeClr val="tx1"/>
+                </a:solidFill>
+                <a:latin typeface="+mn-lt"/>
+                <a:ea typeface="+mn-ea"/>
+                <a:cs typeface="+mn-cs"/>
+              </a:defRPr>
+            </a:lvl3pPr>
+            <a:lvl4pPr marL="1600200" indent="-228600" algn="l" defTabSz="914400" rtl="0" eaLnBrk="1" latinLnBrk="0" hangingPunct="1">
+              <a:lnSpc>
+                <a:spcPct val="90000"/>
+              </a:lnSpc>
+              <a:spcBef>
+                <a:spcPts val="500"/>
+              </a:spcBef>
+              <a:buFont typeface="Arial" panose="020B0604020202020204" pitchFamily="34" charset="0"/>
+              <a:buChar char="•"/>
+              <a:defRPr sz="1800" kern="1200">
+                <a:solidFill>
+                  <a:schemeClr val="tx1"/>
+                </a:solidFill>
+                <a:latin typeface="+mn-lt"/>
+                <a:ea typeface="+mn-ea"/>
+                <a:cs typeface="+mn-cs"/>
+              </a:defRPr>
+            </a:lvl4pPr>
+            <a:lvl5pPr marL="2057400" indent="-228600" algn="l" defTabSz="914400" rtl="0" eaLnBrk="1" latinLnBrk="0" hangingPunct="1">
+              <a:lnSpc>
+                <a:spcPct val="90000"/>
+              </a:lnSpc>
+              <a:spcBef>
+                <a:spcPts val="500"/>
+              </a:spcBef>
+              <a:buFont typeface="Arial" panose="020B0604020202020204" pitchFamily="34" charset="0"/>
+              <a:buChar char="•"/>
+              <a:defRPr sz="1800" kern="1200">
+                <a:solidFill>
+                  <a:schemeClr val="tx1"/>
+                </a:solidFill>
+                <a:latin typeface="+mn-lt"/>
+                <a:ea typeface="+mn-ea"/>
+                <a:cs typeface="+mn-cs"/>
+              </a:defRPr>
+            </a:lvl5pPr>
+            <a:lvl6pPr marL="2514600" indent="-228600" algn="l" defTabSz="914400" rtl="0" eaLnBrk="1" latinLnBrk="0" hangingPunct="1">
+              <a:lnSpc>
+                <a:spcPct val="90000"/>
+              </a:lnSpc>
+              <a:spcBef>
+                <a:spcPts val="500"/>
+              </a:spcBef>
+              <a:buFont typeface="Arial" panose="020B0604020202020204" pitchFamily="34" charset="0"/>
+              <a:buChar char="•"/>
+              <a:defRPr sz="1800" kern="1200">
+                <a:solidFill>
+                  <a:schemeClr val="tx1"/>
+                </a:solidFill>
+                <a:latin typeface="+mn-lt"/>
+                <a:ea typeface="+mn-ea"/>
+                <a:cs typeface="+mn-cs"/>
+              </a:defRPr>
+            </a:lvl6pPr>
+            <a:lvl7pPr marL="2971800" indent="-228600" algn="l" defTabSz="914400" rtl="0" eaLnBrk="1" latinLnBrk="0" hangingPunct="1">
+              <a:lnSpc>
+                <a:spcPct val="90000"/>
+              </a:lnSpc>
+              <a:spcBef>
+                <a:spcPts val="500"/>
+              </a:spcBef>
+              <a:buFont typeface="Arial" panose="020B0604020202020204" pitchFamily="34" charset="0"/>
+              <a:buChar char="•"/>
+              <a:defRPr sz="1800" kern="1200">
+                <a:solidFill>
+                  <a:schemeClr val="tx1"/>
+                </a:solidFill>
+                <a:latin typeface="+mn-lt"/>
+                <a:ea typeface="+mn-ea"/>
+                <a:cs typeface="+mn-cs"/>
+              </a:defRPr>
+            </a:lvl7pPr>
+            <a:lvl8pPr marL="3429000" indent="-228600" algn="l" defTabSz="914400" rtl="0" eaLnBrk="1" latinLnBrk="0" hangingPunct="1">
+              <a:lnSpc>
+                <a:spcPct val="90000"/>
+              </a:lnSpc>
+              <a:spcBef>
+                <a:spcPts val="500"/>
+              </a:spcBef>
+              <a:buFont typeface="Arial" panose="020B0604020202020204" pitchFamily="34" charset="0"/>
+              <a:buChar char="•"/>
+              <a:defRPr sz="1800" kern="1200">
+                <a:solidFill>
+                  <a:schemeClr val="tx1"/>
+                </a:solidFill>
+                <a:latin typeface="+mn-lt"/>
+                <a:ea typeface="+mn-ea"/>
+                <a:cs typeface="+mn-cs"/>
+              </a:defRPr>
+            </a:lvl8pPr>
+            <a:lvl9pPr marL="3886200" indent="-228600" algn="l" defTabSz="914400" rtl="0" eaLnBrk="1" latinLnBrk="0" hangingPunct="1">
+              <a:lnSpc>
+                <a:spcPct val="90000"/>
+              </a:lnSpc>
+              <a:spcBef>
+                <a:spcPts val="500"/>
+              </a:spcBef>
+              <a:buFont typeface="Arial" panose="020B0604020202020204" pitchFamily="34" charset="0"/>
+              <a:buChar char="•"/>
+              <a:defRPr sz="1800" kern="1200">
+                <a:solidFill>
+                  <a:schemeClr val="tx1"/>
+                </a:solidFill>
+                <a:latin typeface="+mn-lt"/>
+                <a:ea typeface="+mn-ea"/>
+                <a:cs typeface="+mn-cs"/>
+              </a:defRPr>
+            </a:lvl9pPr>
+          </a:lstStyle>
+          <a:p>
+            <a:pPr marL="0" indent="0">
+              <a:buNone/>
+            </a:pPr>
+            <a:r>
+              <a:rPr lang="en-US" altLang="zh-CN" sz="2100" b="1" dirty="0">
+                <a:solidFill>
+                  <a:srgbClr val="4D646F"/>
+                </a:solidFill>
+              </a:rPr>
+              <a:t>resynchronization</a:t>
+            </a:r>
+          </a:p>
+        </p:txBody>
+      </p:sp>
+      <p:pic>
+        <p:nvPicPr>
+          <p:cNvPr id="7" name="图片 6">
+            <a:extLst>
+              <a:ext uri="{FF2B5EF4-FFF2-40B4-BE49-F238E27FC236}">
+                <a16:creationId xmlns:a16="http://schemas.microsoft.com/office/drawing/2014/main" id="{769B23F8-B11E-4DFD-B638-25650F87C8C4}"/>
+              </a:ext>
+            </a:extLst>
+          </p:cNvPr>
+          <p:cNvPicPr>
+            <a:picLocks noChangeAspect="1"/>
+          </p:cNvPicPr>
+          <p:nvPr/>
+        </p:nvPicPr>
+        <p:blipFill>
+          <a:blip r:embed="rId2">
+            <a:extLst>
+              <a:ext uri="{28A0092B-C50C-407E-A947-70E740481C1C}">
+                <a14:useLocalDpi xmlns:a14="http://schemas.microsoft.com/office/drawing/2010/main" val="0"/>
+              </a:ext>
+            </a:extLst>
+          </a:blip>
+          <a:stretch>
+            <a:fillRect/>
+          </a:stretch>
+        </p:blipFill>
+        <p:spPr>
+          <a:xfrm>
+            <a:off x="852336" y="2009412"/>
+            <a:ext cx="5524563" cy="688306"/>
+          </a:xfrm>
+          <a:prstGeom prst="rect">
+            <a:avLst/>
+          </a:prstGeom>
+        </p:spPr>
+      </p:pic>
+      <p:pic>
+        <p:nvPicPr>
+          <p:cNvPr id="12" name="图片 11">
+            <a:extLst>
+              <a:ext uri="{FF2B5EF4-FFF2-40B4-BE49-F238E27FC236}">
+                <a16:creationId xmlns:a16="http://schemas.microsoft.com/office/drawing/2014/main" id="{DD27A531-E746-4A9B-A00A-C1414CC0CA51}"/>
+              </a:ext>
+            </a:extLst>
+          </p:cNvPr>
+          <p:cNvPicPr>
+            <a:picLocks noChangeAspect="1"/>
+          </p:cNvPicPr>
+          <p:nvPr/>
+        </p:nvPicPr>
+        <p:blipFill>
+          <a:blip r:embed="rId3">
+            <a:extLst>
+              <a:ext uri="{28A0092B-C50C-407E-A947-70E740481C1C}">
+                <a14:useLocalDpi xmlns:a14="http://schemas.microsoft.com/office/drawing/2010/main" val="0"/>
+              </a:ext>
+            </a:extLst>
+          </a:blip>
+          <a:stretch>
+            <a:fillRect/>
+          </a:stretch>
+        </p:blipFill>
+        <p:spPr>
+          <a:xfrm>
+            <a:off x="852336" y="2828196"/>
+            <a:ext cx="5825495" cy="3647032"/>
+          </a:xfrm>
+          <a:prstGeom prst="rect">
+            <a:avLst/>
+          </a:prstGeom>
+        </p:spPr>
+      </p:pic>
+    </p:spTree>
+    <p:extLst>
+      <p:ext uri="{BB962C8B-B14F-4D97-AF65-F5344CB8AC3E}">
+        <p14:creationId xmlns:p14="http://schemas.microsoft.com/office/powerpoint/2010/main" val="3000242005"/>
+      </p:ext>
+    </p:extLst>
+  </p:cSld>
+  <p:clrMapOvr>
+    <a:masterClrMapping/>
+  </p:clrMapOvr>
+</p:sld>
+</file>
+
+<file path=ppt/slides/slide12.xml><?xml version="1.0" encoding="utf-8"?>
+<p:sld xmlns:a="http://schemas.openxmlformats.org/drawingml/2006/main" xmlns:r="http://schemas.openxmlformats.org/officeDocument/2006/relationships" xmlns:p="http://schemas.openxmlformats.org/presentationml/2006/main">
+  <p:cSld>
+    <p:spTree>
+      <p:nvGrpSpPr>
+        <p:cNvPr id="1" name=""/>
+        <p:cNvGrpSpPr/>
+        <p:nvPr/>
+      </p:nvGrpSpPr>
+      <p:grpSpPr>
+        <a:xfrm>
+          <a:off x="0" y="0"/>
+          <a:ext cx="0" cy="0"/>
+          <a:chOff x="0" y="0"/>
+          <a:chExt cx="0" cy="0"/>
+        </a:xfrm>
+      </p:grpSpPr>
+      <p:sp>
+        <p:nvSpPr>
+          <p:cNvPr id="2" name="矩形 1"/>
+          <p:cNvSpPr/>
+          <p:nvPr/>
+        </p:nvSpPr>
+        <p:spPr>
+          <a:xfrm>
+            <a:off x="-1" y="1933497"/>
+            <a:ext cx="246280" cy="3124652"/>
+          </a:xfrm>
+          <a:prstGeom prst="rect">
+            <a:avLst/>
+          </a:prstGeom>
+          <a:solidFill>
+            <a:srgbClr val="84A2AA"/>
+          </a:solidFill>
+          <a:ln>
+            <a:noFill/>
+          </a:ln>
+        </p:spPr>
+        <p:style>
+          <a:lnRef idx="2">
+            <a:schemeClr val="accent1">
+              <a:shade val="50000"/>
+            </a:schemeClr>
+          </a:lnRef>
+          <a:fillRef idx="1">
+            <a:schemeClr val="accent1"/>
+          </a:fillRef>
+          <a:effectRef idx="0">
+            <a:schemeClr val="accent1"/>
+          </a:effectRef>
+          <a:fontRef idx="minor">
+            <a:schemeClr val="lt1"/>
+          </a:fontRef>
+        </p:style>
+        <p:txBody>
+          <a:bodyPr rtlCol="0" anchor="ctr"/>
+          <a:lstStyle/>
+          <a:p>
+            <a:pPr algn="ctr"/>
+            <a:endParaRPr lang="zh-CN" altLang="en-US" sz="1350"/>
+          </a:p>
+        </p:txBody>
+      </p:sp>
+      <p:sp>
+        <p:nvSpPr>
+          <p:cNvPr id="16" name="圆角矩形 15"/>
+          <p:cNvSpPr/>
+          <p:nvPr/>
+        </p:nvSpPr>
+        <p:spPr>
+          <a:xfrm>
+            <a:off x="591812" y="1467706"/>
+            <a:ext cx="114563" cy="603271"/>
+          </a:xfrm>
+          <a:prstGeom prst="roundRect">
+            <a:avLst/>
+          </a:prstGeom>
+          <a:solidFill>
+            <a:srgbClr val="9D9A88"/>
+          </a:solidFill>
+          <a:ln>
+            <a:noFill/>
+          </a:ln>
+        </p:spPr>
+        <p:style>
+          <a:lnRef idx="2">
+            <a:schemeClr val="accent1">
+              <a:shade val="50000"/>
+            </a:schemeClr>
+          </a:lnRef>
+          <a:fillRef idx="1">
+            <a:schemeClr val="accent1"/>
+          </a:fillRef>
+          <a:effectRef idx="0">
+            <a:schemeClr val="accent1"/>
+          </a:effectRef>
+          <a:fontRef idx="minor">
+            <a:schemeClr val="lt1"/>
+          </a:fontRef>
+        </p:style>
+        <p:txBody>
+          <a:bodyPr rtlCol="0" anchor="ctr"/>
+          <a:lstStyle/>
+          <a:p>
+            <a:pPr algn="ctr"/>
+            <a:endParaRPr lang="zh-CN" altLang="en-US" sz="1350">
+              <a:solidFill>
+                <a:srgbClr val="9D9A88"/>
+              </a:solidFill>
+            </a:endParaRPr>
+          </a:p>
+        </p:txBody>
+      </p:sp>
+      <p:sp>
+        <p:nvSpPr>
+          <p:cNvPr id="17" name="圆角矩形 16"/>
+          <p:cNvSpPr/>
+          <p:nvPr/>
+        </p:nvSpPr>
+        <p:spPr>
+          <a:xfrm>
+            <a:off x="591812" y="2825729"/>
+            <a:ext cx="114563" cy="603271"/>
+          </a:xfrm>
+          <a:prstGeom prst="roundRect">
+            <a:avLst/>
+          </a:prstGeom>
+          <a:solidFill>
+            <a:srgbClr val="9D9A88"/>
+          </a:solidFill>
+          <a:ln>
+            <a:noFill/>
+          </a:ln>
+        </p:spPr>
+        <p:style>
+          <a:lnRef idx="2">
+            <a:schemeClr val="accent1">
+              <a:shade val="50000"/>
+            </a:schemeClr>
+          </a:lnRef>
+          <a:fillRef idx="1">
+            <a:schemeClr val="accent1"/>
+          </a:fillRef>
+          <a:effectRef idx="0">
+            <a:schemeClr val="accent1"/>
+          </a:effectRef>
+          <a:fontRef idx="minor">
+            <a:schemeClr val="lt1"/>
+          </a:fontRef>
+        </p:style>
+        <p:txBody>
+          <a:bodyPr rtlCol="0" anchor="ctr"/>
+          <a:lstStyle/>
+          <a:p>
+            <a:pPr algn="ctr"/>
+            <a:endParaRPr lang="zh-CN" altLang="en-US" sz="1350">
+              <a:solidFill>
+                <a:srgbClr val="9D9A88"/>
+              </a:solidFill>
+            </a:endParaRPr>
+          </a:p>
+        </p:txBody>
+      </p:sp>
+      <p:sp>
+        <p:nvSpPr>
+          <p:cNvPr id="3" name="标题 1"/>
+          <p:cNvSpPr>
+            <a:spLocks noGrp="1"/>
+          </p:cNvSpPr>
+          <p:nvPr/>
+        </p:nvSpPr>
+        <p:spPr>
+          <a:xfrm>
+            <a:off x="473007" y="362609"/>
+            <a:ext cx="7886700" cy="994172"/>
+          </a:xfrm>
+          <a:prstGeom prst="rect">
+            <a:avLst/>
+          </a:prstGeom>
+        </p:spPr>
+        <p:txBody>
+          <a:bodyPr vert="horz" lIns="68580" tIns="34290" rIns="68580" bIns="34290" rtlCol="0" anchor="ctr">
+            <a:normAutofit/>
+          </a:bodyPr>
+          <a:lstStyle>
+            <a:lvl1pPr algn="l" defTabSz="914400" rtl="0" eaLnBrk="1" latinLnBrk="0" hangingPunct="1">
+              <a:lnSpc>
+                <a:spcPct val="90000"/>
+              </a:lnSpc>
+              <a:spcBef>
+                <a:spcPct val="0"/>
+              </a:spcBef>
+              <a:buNone/>
+              <a:defRPr sz="4400" kern="1200">
+                <a:solidFill>
+                  <a:schemeClr val="tx1"/>
+                </a:solidFill>
+                <a:latin typeface="+mj-lt"/>
+                <a:ea typeface="+mj-ea"/>
+                <a:cs typeface="+mj-cs"/>
+              </a:defRPr>
+            </a:lvl1pPr>
+          </a:lstStyle>
+          <a:p>
+            <a:r>
+              <a:rPr lang="en-US" altLang="zh-CN" sz="3000" dirty="0">
+                <a:solidFill>
+                  <a:srgbClr val="4D646F"/>
+                </a:solidFill>
+                <a:latin typeface="+mn-lt"/>
+                <a:ea typeface="+mn-ea"/>
+                <a:cs typeface="+mn-cs"/>
+              </a:rPr>
+              <a:t>Semantic analysis</a:t>
+            </a:r>
+          </a:p>
+        </p:txBody>
+      </p:sp>
+      <p:sp>
+        <p:nvSpPr>
+          <p:cNvPr id="18" name="内容占位符 2"/>
+          <p:cNvSpPr>
+            <a:spLocks noGrp="1"/>
+          </p:cNvSpPr>
+          <p:nvPr/>
+        </p:nvSpPr>
+        <p:spPr>
+          <a:xfrm>
+            <a:off x="784293" y="1356781"/>
+            <a:ext cx="3447239" cy="2407823"/>
+          </a:xfrm>
+          <a:prstGeom prst="rect">
+            <a:avLst/>
+          </a:prstGeom>
+        </p:spPr>
+        <p:txBody>
+          <a:bodyPr vert="horz" lIns="68580" tIns="34290" rIns="68580" bIns="34290" rtlCol="0">
+            <a:normAutofit/>
+          </a:bodyPr>
+          <a:lstStyle>
+            <a:lvl1pPr marL="228600" indent="-228600" algn="l" defTabSz="914400" rtl="0" eaLnBrk="1" latinLnBrk="0" hangingPunct="1">
+              <a:lnSpc>
+                <a:spcPct val="90000"/>
+              </a:lnSpc>
+              <a:spcBef>
+                <a:spcPts val="1000"/>
+              </a:spcBef>
+              <a:buFont typeface="Arial" panose="020B0604020202020204" pitchFamily="34" charset="0"/>
+              <a:buChar char="•"/>
+              <a:defRPr sz="2800" kern="1200">
+                <a:solidFill>
+                  <a:schemeClr val="tx1"/>
+                </a:solidFill>
+                <a:latin typeface="+mn-lt"/>
+                <a:ea typeface="+mn-ea"/>
+                <a:cs typeface="+mn-cs"/>
+              </a:defRPr>
+            </a:lvl1pPr>
+            <a:lvl2pPr marL="685800" indent="-228600" algn="l" defTabSz="914400" rtl="0" eaLnBrk="1" latinLnBrk="0" hangingPunct="1">
+              <a:lnSpc>
+                <a:spcPct val="90000"/>
+              </a:lnSpc>
+              <a:spcBef>
+                <a:spcPts val="500"/>
+              </a:spcBef>
+              <a:buFont typeface="Arial" panose="020B0604020202020204" pitchFamily="34" charset="0"/>
+              <a:buChar char="•"/>
+              <a:defRPr sz="2400" kern="1200">
+                <a:solidFill>
+                  <a:schemeClr val="tx1"/>
+                </a:solidFill>
+                <a:latin typeface="+mn-lt"/>
+                <a:ea typeface="+mn-ea"/>
+                <a:cs typeface="+mn-cs"/>
+              </a:defRPr>
+            </a:lvl2pPr>
+            <a:lvl3pPr marL="1143000" indent="-228600" algn="l" defTabSz="914400" rtl="0" eaLnBrk="1" latinLnBrk="0" hangingPunct="1">
+              <a:lnSpc>
+                <a:spcPct val="90000"/>
+              </a:lnSpc>
+              <a:spcBef>
+                <a:spcPts val="500"/>
+              </a:spcBef>
+              <a:buFont typeface="Arial" panose="020B0604020202020204" pitchFamily="34" charset="0"/>
+              <a:buChar char="•"/>
+              <a:defRPr sz="2000" kern="1200">
+                <a:solidFill>
+                  <a:schemeClr val="tx1"/>
+                </a:solidFill>
+                <a:latin typeface="+mn-lt"/>
+                <a:ea typeface="+mn-ea"/>
+                <a:cs typeface="+mn-cs"/>
+              </a:defRPr>
+            </a:lvl3pPr>
+            <a:lvl4pPr marL="1600200" indent="-228600" algn="l" defTabSz="914400" rtl="0" eaLnBrk="1" latinLnBrk="0" hangingPunct="1">
+              <a:lnSpc>
+                <a:spcPct val="90000"/>
+              </a:lnSpc>
+              <a:spcBef>
+                <a:spcPts val="500"/>
+              </a:spcBef>
+              <a:buFont typeface="Arial" panose="020B0604020202020204" pitchFamily="34" charset="0"/>
+              <a:buChar char="•"/>
+              <a:defRPr sz="1800" kern="1200">
+                <a:solidFill>
+                  <a:schemeClr val="tx1"/>
+                </a:solidFill>
+                <a:latin typeface="+mn-lt"/>
+                <a:ea typeface="+mn-ea"/>
+                <a:cs typeface="+mn-cs"/>
+              </a:defRPr>
+            </a:lvl4pPr>
+            <a:lvl5pPr marL="2057400" indent="-228600" algn="l" defTabSz="914400" rtl="0" eaLnBrk="1" latinLnBrk="0" hangingPunct="1">
+              <a:lnSpc>
+                <a:spcPct val="90000"/>
+              </a:lnSpc>
+              <a:spcBef>
+                <a:spcPts val="500"/>
+              </a:spcBef>
+              <a:buFont typeface="Arial" panose="020B0604020202020204" pitchFamily="34" charset="0"/>
+              <a:buChar char="•"/>
+              <a:defRPr sz="1800" kern="1200">
+                <a:solidFill>
+                  <a:schemeClr val="tx1"/>
+                </a:solidFill>
+                <a:latin typeface="+mn-lt"/>
+                <a:ea typeface="+mn-ea"/>
+                <a:cs typeface="+mn-cs"/>
+              </a:defRPr>
+            </a:lvl5pPr>
+            <a:lvl6pPr marL="2514600" indent="-228600" algn="l" defTabSz="914400" rtl="0" eaLnBrk="1" latinLnBrk="0" hangingPunct="1">
+              <a:lnSpc>
+                <a:spcPct val="90000"/>
+              </a:lnSpc>
+              <a:spcBef>
+                <a:spcPts val="500"/>
+              </a:spcBef>
+              <a:buFont typeface="Arial" panose="020B0604020202020204" pitchFamily="34" charset="0"/>
+              <a:buChar char="•"/>
+              <a:defRPr sz="1800" kern="1200">
+                <a:solidFill>
+                  <a:schemeClr val="tx1"/>
+                </a:solidFill>
+                <a:latin typeface="+mn-lt"/>
+                <a:ea typeface="+mn-ea"/>
+                <a:cs typeface="+mn-cs"/>
+              </a:defRPr>
+            </a:lvl6pPr>
+            <a:lvl7pPr marL="2971800" indent="-228600" algn="l" defTabSz="914400" rtl="0" eaLnBrk="1" latinLnBrk="0" hangingPunct="1">
+              <a:lnSpc>
+                <a:spcPct val="90000"/>
+              </a:lnSpc>
+              <a:spcBef>
+                <a:spcPts val="500"/>
+              </a:spcBef>
+              <a:buFont typeface="Arial" panose="020B0604020202020204" pitchFamily="34" charset="0"/>
+              <a:buChar char="•"/>
+              <a:defRPr sz="1800" kern="1200">
+                <a:solidFill>
+                  <a:schemeClr val="tx1"/>
+                </a:solidFill>
+                <a:latin typeface="+mn-lt"/>
+                <a:ea typeface="+mn-ea"/>
+                <a:cs typeface="+mn-cs"/>
+              </a:defRPr>
+            </a:lvl7pPr>
+            <a:lvl8pPr marL="3429000" indent="-228600" algn="l" defTabSz="914400" rtl="0" eaLnBrk="1" latinLnBrk="0" hangingPunct="1">
+              <a:lnSpc>
+                <a:spcPct val="90000"/>
+              </a:lnSpc>
+              <a:spcBef>
+                <a:spcPts val="500"/>
+              </a:spcBef>
+              <a:buFont typeface="Arial" panose="020B0604020202020204" pitchFamily="34" charset="0"/>
+              <a:buChar char="•"/>
+              <a:defRPr sz="1800" kern="1200">
+                <a:solidFill>
+                  <a:schemeClr val="tx1"/>
+                </a:solidFill>
+                <a:latin typeface="+mn-lt"/>
+                <a:ea typeface="+mn-ea"/>
+                <a:cs typeface="+mn-cs"/>
+              </a:defRPr>
+            </a:lvl8pPr>
+            <a:lvl9pPr marL="3886200" indent="-228600" algn="l" defTabSz="914400" rtl="0" eaLnBrk="1" latinLnBrk="0" hangingPunct="1">
+              <a:lnSpc>
+                <a:spcPct val="90000"/>
+              </a:lnSpc>
+              <a:spcBef>
+                <a:spcPts val="500"/>
+              </a:spcBef>
+              <a:buFont typeface="Arial" panose="020B0604020202020204" pitchFamily="34" charset="0"/>
+              <a:buChar char="•"/>
+              <a:defRPr sz="1800" kern="1200">
+                <a:solidFill>
+                  <a:schemeClr val="tx1"/>
+                </a:solidFill>
+                <a:latin typeface="+mn-lt"/>
+                <a:ea typeface="+mn-ea"/>
+                <a:cs typeface="+mn-cs"/>
+              </a:defRPr>
+            </a:lvl9pPr>
+          </a:lstStyle>
+          <a:p>
+            <a:r>
+              <a:rPr lang="en-US" altLang="zh-CN" sz="2100" b="1" dirty="0">
+                <a:solidFill>
+                  <a:srgbClr val="4D646F"/>
+                </a:solidFill>
+                <a:sym typeface="+mn-ea"/>
+              </a:rPr>
+              <a:t>More</a:t>
+            </a:r>
+          </a:p>
+          <a:p>
+            <a:pPr marL="0" indent="0">
+              <a:buNone/>
+            </a:pPr>
+            <a:endParaRPr lang="en-US" altLang="zh-CN" sz="1700" dirty="0">
+              <a:solidFill>
+                <a:srgbClr val="4D646F"/>
+              </a:solidFill>
+            </a:endParaRPr>
+          </a:p>
+        </p:txBody>
+      </p:sp>
+    </p:spTree>
+    <p:extLst>
+      <p:ext uri="{BB962C8B-B14F-4D97-AF65-F5344CB8AC3E}">
+        <p14:creationId xmlns:p14="http://schemas.microsoft.com/office/powerpoint/2010/main" val="4005512263"/>
+      </p:ext>
+    </p:extLst>
+  </p:cSld>
+  <p:clrMapOvr>
+    <a:masterClrMapping/>
+  </p:clrMapOvr>
+</p:sld>
+</file>
+
+<file path=ppt/slides/slide13.xml><?xml version="1.0" encoding="utf-8"?>
+<p:sld xmlns:a="http://schemas.openxmlformats.org/drawingml/2006/main" xmlns:r="http://schemas.openxmlformats.org/officeDocument/2006/relationships" xmlns:p="http://schemas.openxmlformats.org/presentationml/2006/main">
+  <p:cSld>
+    <p:spTree>
+      <p:nvGrpSpPr>
+        <p:cNvPr id="1" name=""/>
+        <p:cNvGrpSpPr/>
+        <p:nvPr/>
+      </p:nvGrpSpPr>
+      <p:grpSpPr>
+        <a:xfrm>
+          <a:off x="0" y="0"/>
+          <a:ext cx="0" cy="0"/>
+          <a:chOff x="0" y="0"/>
+          <a:chExt cx="0" cy="0"/>
+        </a:xfrm>
+      </p:grpSpPr>
       <p:pic>
         <p:nvPicPr>
           <p:cNvPr id="6" name="图片 5"/>
@@ -4527,7 +6521,7 @@
 </p:sld>
 </file>
 
-<file path=ppt/slides/slide11.xml><?xml version="1.0" encoding="utf-8"?>
+<file path=ppt/slides/slide14.xml><?xml version="1.0" encoding="utf-8"?>
 <p:sld xmlns:a="http://schemas.openxmlformats.org/drawingml/2006/main" xmlns:r="http://schemas.openxmlformats.org/officeDocument/2006/relationships" xmlns:p="http://schemas.openxmlformats.org/presentationml/2006/main">
   <p:cSld>
     <p:spTree>
@@ -4633,7 +6627,7 @@
 </p:sld>
 </file>
 
-<file path=ppt/slides/slide12.xml><?xml version="1.0" encoding="utf-8"?>
+<file path=ppt/slides/slide15.xml><?xml version="1.0" encoding="utf-8"?>
 <p:sld xmlns:a="http://schemas.openxmlformats.org/drawingml/2006/main" xmlns:r="http://schemas.openxmlformats.org/officeDocument/2006/relationships" xmlns:p="http://schemas.openxmlformats.org/presentationml/2006/main">
   <p:cSld>
     <p:spTree>
@@ -10578,6 +12572,370 @@
           </a:p>
         </p:txBody>
       </p:sp>
+      <p:sp>
+        <p:nvSpPr>
+          <p:cNvPr id="8" name="内容占位符 2">
+            <a:extLst>
+              <a:ext uri="{FF2B5EF4-FFF2-40B4-BE49-F238E27FC236}">
+                <a16:creationId xmlns:a16="http://schemas.microsoft.com/office/drawing/2014/main" id="{7C72F879-5BBB-4F18-84B5-999A44866174}"/>
+              </a:ext>
+            </a:extLst>
+          </p:cNvPr>
+          <p:cNvSpPr>
+            <a:spLocks noGrp="1"/>
+          </p:cNvSpPr>
+          <p:nvPr/>
+        </p:nvSpPr>
+        <p:spPr>
+          <a:xfrm>
+            <a:off x="1129826" y="1534629"/>
+            <a:ext cx="4115896" cy="4370061"/>
+          </a:xfrm>
+          <a:prstGeom prst="rect">
+            <a:avLst/>
+          </a:prstGeom>
+        </p:spPr>
+        <p:txBody>
+          <a:bodyPr vert="horz" lIns="68580" tIns="34290" rIns="68580" bIns="34290" rtlCol="0">
+            <a:normAutofit lnSpcReduction="10000"/>
+          </a:bodyPr>
+          <a:lstStyle>
+            <a:lvl1pPr marL="228600" indent="-228600" algn="l" defTabSz="914400" rtl="0" eaLnBrk="1" latinLnBrk="0" hangingPunct="1">
+              <a:lnSpc>
+                <a:spcPct val="90000"/>
+              </a:lnSpc>
+              <a:spcBef>
+                <a:spcPts val="1000"/>
+              </a:spcBef>
+              <a:buFont typeface="Arial" panose="020B0604020202020204" pitchFamily="34" charset="0"/>
+              <a:buChar char="•"/>
+              <a:defRPr sz="2800" kern="1200">
+                <a:solidFill>
+                  <a:schemeClr val="tx1"/>
+                </a:solidFill>
+                <a:latin typeface="+mn-lt"/>
+                <a:ea typeface="+mn-ea"/>
+                <a:cs typeface="+mn-cs"/>
+              </a:defRPr>
+            </a:lvl1pPr>
+            <a:lvl2pPr marL="685800" indent="-228600" algn="l" defTabSz="914400" rtl="0" eaLnBrk="1" latinLnBrk="0" hangingPunct="1">
+              <a:lnSpc>
+                <a:spcPct val="90000"/>
+              </a:lnSpc>
+              <a:spcBef>
+                <a:spcPts val="500"/>
+              </a:spcBef>
+              <a:buFont typeface="Arial" panose="020B0604020202020204" pitchFamily="34" charset="0"/>
+              <a:buChar char="•"/>
+              <a:defRPr sz="2400" kern="1200">
+                <a:solidFill>
+                  <a:schemeClr val="tx1"/>
+                </a:solidFill>
+                <a:latin typeface="+mn-lt"/>
+                <a:ea typeface="+mn-ea"/>
+                <a:cs typeface="+mn-cs"/>
+              </a:defRPr>
+            </a:lvl2pPr>
+            <a:lvl3pPr marL="1143000" indent="-228600" algn="l" defTabSz="914400" rtl="0" eaLnBrk="1" latinLnBrk="0" hangingPunct="1">
+              <a:lnSpc>
+                <a:spcPct val="90000"/>
+              </a:lnSpc>
+              <a:spcBef>
+                <a:spcPts val="500"/>
+              </a:spcBef>
+              <a:buFont typeface="Arial" panose="020B0604020202020204" pitchFamily="34" charset="0"/>
+              <a:buChar char="•"/>
+              <a:defRPr sz="2000" kern="1200">
+                <a:solidFill>
+                  <a:schemeClr val="tx1"/>
+                </a:solidFill>
+                <a:latin typeface="+mn-lt"/>
+                <a:ea typeface="+mn-ea"/>
+                <a:cs typeface="+mn-cs"/>
+              </a:defRPr>
+            </a:lvl3pPr>
+            <a:lvl4pPr marL="1600200" indent="-228600" algn="l" defTabSz="914400" rtl="0" eaLnBrk="1" latinLnBrk="0" hangingPunct="1">
+              <a:lnSpc>
+                <a:spcPct val="90000"/>
+              </a:lnSpc>
+              <a:spcBef>
+                <a:spcPts val="500"/>
+              </a:spcBef>
+              <a:buFont typeface="Arial" panose="020B0604020202020204" pitchFamily="34" charset="0"/>
+              <a:buChar char="•"/>
+              <a:defRPr sz="1800" kern="1200">
+                <a:solidFill>
+                  <a:schemeClr val="tx1"/>
+                </a:solidFill>
+                <a:latin typeface="+mn-lt"/>
+                <a:ea typeface="+mn-ea"/>
+                <a:cs typeface="+mn-cs"/>
+              </a:defRPr>
+            </a:lvl4pPr>
+            <a:lvl5pPr marL="2057400" indent="-228600" algn="l" defTabSz="914400" rtl="0" eaLnBrk="1" latinLnBrk="0" hangingPunct="1">
+              <a:lnSpc>
+                <a:spcPct val="90000"/>
+              </a:lnSpc>
+              <a:spcBef>
+                <a:spcPts val="500"/>
+              </a:spcBef>
+              <a:buFont typeface="Arial" panose="020B0604020202020204" pitchFamily="34" charset="0"/>
+              <a:buChar char="•"/>
+              <a:defRPr sz="1800" kern="1200">
+                <a:solidFill>
+                  <a:schemeClr val="tx1"/>
+                </a:solidFill>
+                <a:latin typeface="+mn-lt"/>
+                <a:ea typeface="+mn-ea"/>
+                <a:cs typeface="+mn-cs"/>
+              </a:defRPr>
+            </a:lvl5pPr>
+            <a:lvl6pPr marL="2514600" indent="-228600" algn="l" defTabSz="914400" rtl="0" eaLnBrk="1" latinLnBrk="0" hangingPunct="1">
+              <a:lnSpc>
+                <a:spcPct val="90000"/>
+              </a:lnSpc>
+              <a:spcBef>
+                <a:spcPts val="500"/>
+              </a:spcBef>
+              <a:buFont typeface="Arial" panose="020B0604020202020204" pitchFamily="34" charset="0"/>
+              <a:buChar char="•"/>
+              <a:defRPr sz="1800" kern="1200">
+                <a:solidFill>
+                  <a:schemeClr val="tx1"/>
+                </a:solidFill>
+                <a:latin typeface="+mn-lt"/>
+                <a:ea typeface="+mn-ea"/>
+                <a:cs typeface="+mn-cs"/>
+              </a:defRPr>
+            </a:lvl6pPr>
+            <a:lvl7pPr marL="2971800" indent="-228600" algn="l" defTabSz="914400" rtl="0" eaLnBrk="1" latinLnBrk="0" hangingPunct="1">
+              <a:lnSpc>
+                <a:spcPct val="90000"/>
+              </a:lnSpc>
+              <a:spcBef>
+                <a:spcPts val="500"/>
+              </a:spcBef>
+              <a:buFont typeface="Arial" panose="020B0604020202020204" pitchFamily="34" charset="0"/>
+              <a:buChar char="•"/>
+              <a:defRPr sz="1800" kern="1200">
+                <a:solidFill>
+                  <a:schemeClr val="tx1"/>
+                </a:solidFill>
+                <a:latin typeface="+mn-lt"/>
+                <a:ea typeface="+mn-ea"/>
+                <a:cs typeface="+mn-cs"/>
+              </a:defRPr>
+            </a:lvl7pPr>
+            <a:lvl8pPr marL="3429000" indent="-228600" algn="l" defTabSz="914400" rtl="0" eaLnBrk="1" latinLnBrk="0" hangingPunct="1">
+              <a:lnSpc>
+                <a:spcPct val="90000"/>
+              </a:lnSpc>
+              <a:spcBef>
+                <a:spcPts val="500"/>
+              </a:spcBef>
+              <a:buFont typeface="Arial" panose="020B0604020202020204" pitchFamily="34" charset="0"/>
+              <a:buChar char="•"/>
+              <a:defRPr sz="1800" kern="1200">
+                <a:solidFill>
+                  <a:schemeClr val="tx1"/>
+                </a:solidFill>
+                <a:latin typeface="+mn-lt"/>
+                <a:ea typeface="+mn-ea"/>
+                <a:cs typeface="+mn-cs"/>
+              </a:defRPr>
+            </a:lvl8pPr>
+            <a:lvl9pPr marL="3886200" indent="-228600" algn="l" defTabSz="914400" rtl="0" eaLnBrk="1" latinLnBrk="0" hangingPunct="1">
+              <a:lnSpc>
+                <a:spcPct val="90000"/>
+              </a:lnSpc>
+              <a:spcBef>
+                <a:spcPts val="500"/>
+              </a:spcBef>
+              <a:buFont typeface="Arial" panose="020B0604020202020204" pitchFamily="34" charset="0"/>
+              <a:buChar char="•"/>
+              <a:defRPr sz="1800" kern="1200">
+                <a:solidFill>
+                  <a:schemeClr val="tx1"/>
+                </a:solidFill>
+                <a:latin typeface="+mn-lt"/>
+                <a:ea typeface="+mn-ea"/>
+                <a:cs typeface="+mn-cs"/>
+              </a:defRPr>
+            </a:lvl9pPr>
+          </a:lstStyle>
+          <a:p>
+            <a:r>
+              <a:rPr lang="en-US" altLang="zh-CN" sz="2100" b="1" dirty="0">
+                <a:solidFill>
+                  <a:srgbClr val="4D646F"/>
+                </a:solidFill>
+              </a:rPr>
+              <a:t>TOKEN</a:t>
+            </a:r>
+          </a:p>
+          <a:p>
+            <a:pPr marL="0" indent="0">
+              <a:buNone/>
+            </a:pPr>
+            <a:r>
+              <a:rPr lang="fr-FR" altLang="zh-CN" sz="2100" dirty="0">
+                <a:solidFill>
+                  <a:srgbClr val="4D646F"/>
+                </a:solidFill>
+              </a:rPr>
+              <a:t> </a:t>
+            </a:r>
+            <a:r>
+              <a:rPr lang="fr-FR" altLang="zh-CN" sz="1700" dirty="0">
+                <a:solidFill>
+                  <a:srgbClr val="4D646F"/>
+                </a:solidFill>
+              </a:rPr>
+              <a:t>t_ASSIGN = r':=‘</a:t>
+            </a:r>
+          </a:p>
+          <a:p>
+            <a:pPr marL="0" indent="0">
+              <a:buNone/>
+            </a:pPr>
+            <a:r>
+              <a:rPr lang="fr-FR" altLang="zh-CN" sz="1700" dirty="0">
+                <a:solidFill>
+                  <a:srgbClr val="4D646F"/>
+                </a:solidFill>
+              </a:rPr>
+              <a:t> t_EQUAL = r'=‘</a:t>
+            </a:r>
+          </a:p>
+          <a:p>
+            <a:pPr marL="0" indent="0">
+              <a:buNone/>
+            </a:pPr>
+            <a:r>
+              <a:rPr lang="fr-FR" altLang="zh-CN" sz="1700" dirty="0">
+                <a:solidFill>
+                  <a:srgbClr val="4D646F"/>
+                </a:solidFill>
+              </a:rPr>
+              <a:t> t_UNEQUAL = r'&lt;&gt;’</a:t>
+            </a:r>
+          </a:p>
+          <a:p>
+            <a:pPr marL="0" indent="0">
+              <a:buNone/>
+            </a:pPr>
+            <a:r>
+              <a:rPr lang="fr-FR" altLang="zh-CN" sz="1700" dirty="0">
+                <a:solidFill>
+                  <a:srgbClr val="4D646F"/>
+                </a:solidFill>
+              </a:rPr>
+              <a:t> ...</a:t>
+            </a:r>
+          </a:p>
+          <a:p>
+            <a:pPr marL="0" indent="0">
+              <a:buNone/>
+            </a:pPr>
+            <a:endParaRPr lang="fr-FR" altLang="zh-CN" sz="1700" dirty="0">
+              <a:solidFill>
+                <a:srgbClr val="4D646F"/>
+              </a:solidFill>
+            </a:endParaRPr>
+          </a:p>
+          <a:p>
+            <a:pPr marL="0" indent="0">
+              <a:buNone/>
+            </a:pPr>
+            <a:r>
+              <a:rPr lang="en-US" altLang="zh-CN" sz="1700" dirty="0" err="1">
+                <a:solidFill>
+                  <a:srgbClr val="4D646F"/>
+                </a:solidFill>
+              </a:rPr>
+              <a:t>interger</a:t>
+            </a:r>
+            <a:r>
+              <a:rPr lang="en-US" altLang="zh-CN" sz="1700" dirty="0">
+                <a:solidFill>
+                  <a:srgbClr val="4D646F"/>
+                </a:solidFill>
+              </a:rPr>
+              <a:t> = r'\d+’</a:t>
+            </a:r>
+          </a:p>
+          <a:p>
+            <a:pPr marL="0" indent="0">
+              <a:buNone/>
+            </a:pPr>
+            <a:r>
+              <a:rPr lang="fr-FR" altLang="zh-CN" sz="1700" dirty="0">
+                <a:solidFill>
+                  <a:srgbClr val="4D646F"/>
+                </a:solidFill>
+              </a:rPr>
+              <a:t>@TOKEN(interger)</a:t>
+            </a:r>
+          </a:p>
+          <a:p>
+            <a:pPr marL="0" indent="0">
+              <a:buNone/>
+            </a:pPr>
+            <a:r>
+              <a:rPr lang="fr-FR" altLang="zh-CN" sz="1700" dirty="0">
+                <a:solidFill>
+                  <a:srgbClr val="4D646F"/>
+                </a:solidFill>
+              </a:rPr>
+              <a:t>def t_INTEGER(t):</a:t>
+            </a:r>
+          </a:p>
+          <a:p>
+            <a:pPr marL="0" indent="0">
+              <a:buNone/>
+            </a:pPr>
+            <a:r>
+              <a:rPr lang="fr-FR" altLang="zh-CN" sz="1700" dirty="0">
+                <a:solidFill>
+                  <a:srgbClr val="4D646F"/>
+                </a:solidFill>
+              </a:rPr>
+              <a:t>    t.value = int(t.value)</a:t>
+            </a:r>
+          </a:p>
+          <a:p>
+            <a:pPr marL="0" indent="0">
+              <a:buNone/>
+            </a:pPr>
+            <a:r>
+              <a:rPr lang="fr-FR" altLang="zh-CN" sz="1700" dirty="0">
+                <a:solidFill>
+                  <a:srgbClr val="4D646F"/>
+                </a:solidFill>
+              </a:rPr>
+              <a:t>    return t</a:t>
+            </a:r>
+          </a:p>
+          <a:p>
+            <a:pPr marL="0" indent="0">
+              <a:buNone/>
+            </a:pPr>
+            <a:r>
+              <a:rPr lang="fr-FR" altLang="zh-CN" sz="1700" dirty="0">
+                <a:solidFill>
+                  <a:srgbClr val="4D646F"/>
+                </a:solidFill>
+              </a:rPr>
+              <a:t>...</a:t>
+            </a:r>
+            <a:endParaRPr lang="en-US" altLang="zh-CN" sz="1700" dirty="0">
+              <a:solidFill>
+                <a:srgbClr val="4D646F"/>
+              </a:solidFill>
+            </a:endParaRPr>
+          </a:p>
+        </p:txBody>
+      </p:sp>
     </p:spTree>
     <p:extLst>
       <p:ext uri="{BB962C8B-B14F-4D97-AF65-F5344CB8AC3E}">
@@ -11569,6 +13927,350 @@
           </a:p>
         </p:txBody>
       </p:sp>
+      <p:sp>
+        <p:nvSpPr>
+          <p:cNvPr id="9" name="内容占位符 2">
+            <a:extLst>
+              <a:ext uri="{FF2B5EF4-FFF2-40B4-BE49-F238E27FC236}">
+                <a16:creationId xmlns:a16="http://schemas.microsoft.com/office/drawing/2014/main" id="{D2D5639C-9CEF-4502-A895-B1359544C54B}"/>
+              </a:ext>
+            </a:extLst>
+          </p:cNvPr>
+          <p:cNvSpPr>
+            <a:spLocks noGrp="1"/>
+          </p:cNvSpPr>
+          <p:nvPr/>
+        </p:nvSpPr>
+        <p:spPr>
+          <a:xfrm>
+            <a:off x="706375" y="3886479"/>
+            <a:ext cx="3447239" cy="1801089"/>
+          </a:xfrm>
+          <a:prstGeom prst="rect">
+            <a:avLst/>
+          </a:prstGeom>
+        </p:spPr>
+        <p:txBody>
+          <a:bodyPr vert="horz" lIns="68580" tIns="34290" rIns="68580" bIns="34290" rtlCol="0">
+            <a:normAutofit/>
+          </a:bodyPr>
+          <a:lstStyle>
+            <a:lvl1pPr marL="228600" indent="-228600" algn="l" defTabSz="914400" rtl="0" eaLnBrk="1" latinLnBrk="0" hangingPunct="1">
+              <a:lnSpc>
+                <a:spcPct val="90000"/>
+              </a:lnSpc>
+              <a:spcBef>
+                <a:spcPts val="1000"/>
+              </a:spcBef>
+              <a:buFont typeface="Arial" panose="020B0604020202020204" pitchFamily="34" charset="0"/>
+              <a:buChar char="•"/>
+              <a:defRPr sz="2800" kern="1200">
+                <a:solidFill>
+                  <a:schemeClr val="tx1"/>
+                </a:solidFill>
+                <a:latin typeface="+mn-lt"/>
+                <a:ea typeface="+mn-ea"/>
+                <a:cs typeface="+mn-cs"/>
+              </a:defRPr>
+            </a:lvl1pPr>
+            <a:lvl2pPr marL="685800" indent="-228600" algn="l" defTabSz="914400" rtl="0" eaLnBrk="1" latinLnBrk="0" hangingPunct="1">
+              <a:lnSpc>
+                <a:spcPct val="90000"/>
+              </a:lnSpc>
+              <a:spcBef>
+                <a:spcPts val="500"/>
+              </a:spcBef>
+              <a:buFont typeface="Arial" panose="020B0604020202020204" pitchFamily="34" charset="0"/>
+              <a:buChar char="•"/>
+              <a:defRPr sz="2400" kern="1200">
+                <a:solidFill>
+                  <a:schemeClr val="tx1"/>
+                </a:solidFill>
+                <a:latin typeface="+mn-lt"/>
+                <a:ea typeface="+mn-ea"/>
+                <a:cs typeface="+mn-cs"/>
+              </a:defRPr>
+            </a:lvl2pPr>
+            <a:lvl3pPr marL="1143000" indent="-228600" algn="l" defTabSz="914400" rtl="0" eaLnBrk="1" latinLnBrk="0" hangingPunct="1">
+              <a:lnSpc>
+                <a:spcPct val="90000"/>
+              </a:lnSpc>
+              <a:spcBef>
+                <a:spcPts val="500"/>
+              </a:spcBef>
+              <a:buFont typeface="Arial" panose="020B0604020202020204" pitchFamily="34" charset="0"/>
+              <a:buChar char="•"/>
+              <a:defRPr sz="2000" kern="1200">
+                <a:solidFill>
+                  <a:schemeClr val="tx1"/>
+                </a:solidFill>
+                <a:latin typeface="+mn-lt"/>
+                <a:ea typeface="+mn-ea"/>
+                <a:cs typeface="+mn-cs"/>
+              </a:defRPr>
+            </a:lvl3pPr>
+            <a:lvl4pPr marL="1600200" indent="-228600" algn="l" defTabSz="914400" rtl="0" eaLnBrk="1" latinLnBrk="0" hangingPunct="1">
+              <a:lnSpc>
+                <a:spcPct val="90000"/>
+              </a:lnSpc>
+              <a:spcBef>
+                <a:spcPts val="500"/>
+              </a:spcBef>
+              <a:buFont typeface="Arial" panose="020B0604020202020204" pitchFamily="34" charset="0"/>
+              <a:buChar char="•"/>
+              <a:defRPr sz="1800" kern="1200">
+                <a:solidFill>
+                  <a:schemeClr val="tx1"/>
+                </a:solidFill>
+                <a:latin typeface="+mn-lt"/>
+                <a:ea typeface="+mn-ea"/>
+                <a:cs typeface="+mn-cs"/>
+              </a:defRPr>
+            </a:lvl4pPr>
+            <a:lvl5pPr marL="2057400" indent="-228600" algn="l" defTabSz="914400" rtl="0" eaLnBrk="1" latinLnBrk="0" hangingPunct="1">
+              <a:lnSpc>
+                <a:spcPct val="90000"/>
+              </a:lnSpc>
+              <a:spcBef>
+                <a:spcPts val="500"/>
+              </a:spcBef>
+              <a:buFont typeface="Arial" panose="020B0604020202020204" pitchFamily="34" charset="0"/>
+              <a:buChar char="•"/>
+              <a:defRPr sz="1800" kern="1200">
+                <a:solidFill>
+                  <a:schemeClr val="tx1"/>
+                </a:solidFill>
+                <a:latin typeface="+mn-lt"/>
+                <a:ea typeface="+mn-ea"/>
+                <a:cs typeface="+mn-cs"/>
+              </a:defRPr>
+            </a:lvl5pPr>
+            <a:lvl6pPr marL="2514600" indent="-228600" algn="l" defTabSz="914400" rtl="0" eaLnBrk="1" latinLnBrk="0" hangingPunct="1">
+              <a:lnSpc>
+                <a:spcPct val="90000"/>
+              </a:lnSpc>
+              <a:spcBef>
+                <a:spcPts val="500"/>
+              </a:spcBef>
+              <a:buFont typeface="Arial" panose="020B0604020202020204" pitchFamily="34" charset="0"/>
+              <a:buChar char="•"/>
+              <a:defRPr sz="1800" kern="1200">
+                <a:solidFill>
+                  <a:schemeClr val="tx1"/>
+                </a:solidFill>
+                <a:latin typeface="+mn-lt"/>
+                <a:ea typeface="+mn-ea"/>
+                <a:cs typeface="+mn-cs"/>
+              </a:defRPr>
+            </a:lvl6pPr>
+            <a:lvl7pPr marL="2971800" indent="-228600" algn="l" defTabSz="914400" rtl="0" eaLnBrk="1" latinLnBrk="0" hangingPunct="1">
+              <a:lnSpc>
+                <a:spcPct val="90000"/>
+              </a:lnSpc>
+              <a:spcBef>
+                <a:spcPts val="500"/>
+              </a:spcBef>
+              <a:buFont typeface="Arial" panose="020B0604020202020204" pitchFamily="34" charset="0"/>
+              <a:buChar char="•"/>
+              <a:defRPr sz="1800" kern="1200">
+                <a:solidFill>
+                  <a:schemeClr val="tx1"/>
+                </a:solidFill>
+                <a:latin typeface="+mn-lt"/>
+                <a:ea typeface="+mn-ea"/>
+                <a:cs typeface="+mn-cs"/>
+              </a:defRPr>
+            </a:lvl7pPr>
+            <a:lvl8pPr marL="3429000" indent="-228600" algn="l" defTabSz="914400" rtl="0" eaLnBrk="1" latinLnBrk="0" hangingPunct="1">
+              <a:lnSpc>
+                <a:spcPct val="90000"/>
+              </a:lnSpc>
+              <a:spcBef>
+                <a:spcPts val="500"/>
+              </a:spcBef>
+              <a:buFont typeface="Arial" panose="020B0604020202020204" pitchFamily="34" charset="0"/>
+              <a:buChar char="•"/>
+              <a:defRPr sz="1800" kern="1200">
+                <a:solidFill>
+                  <a:schemeClr val="tx1"/>
+                </a:solidFill>
+                <a:latin typeface="+mn-lt"/>
+                <a:ea typeface="+mn-ea"/>
+                <a:cs typeface="+mn-cs"/>
+              </a:defRPr>
+            </a:lvl8pPr>
+            <a:lvl9pPr marL="3886200" indent="-228600" algn="l" defTabSz="914400" rtl="0" eaLnBrk="1" latinLnBrk="0" hangingPunct="1">
+              <a:lnSpc>
+                <a:spcPct val="90000"/>
+              </a:lnSpc>
+              <a:spcBef>
+                <a:spcPts val="500"/>
+              </a:spcBef>
+              <a:buFont typeface="Arial" panose="020B0604020202020204" pitchFamily="34" charset="0"/>
+              <a:buChar char="•"/>
+              <a:defRPr sz="1800" kern="1200">
+                <a:solidFill>
+                  <a:schemeClr val="tx1"/>
+                </a:solidFill>
+                <a:latin typeface="+mn-lt"/>
+                <a:ea typeface="+mn-ea"/>
+                <a:cs typeface="+mn-cs"/>
+              </a:defRPr>
+            </a:lvl9pPr>
+          </a:lstStyle>
+          <a:p>
+            <a:r>
+              <a:rPr lang="en-US" altLang="zh-CN" sz="2100" b="1" dirty="0">
+                <a:solidFill>
+                  <a:srgbClr val="4D646F"/>
+                </a:solidFill>
+                <a:sym typeface="+mn-ea"/>
+              </a:rPr>
+              <a:t>Ambiguity</a:t>
+            </a:r>
+          </a:p>
+          <a:p>
+            <a:pPr marL="0" indent="0">
+              <a:buNone/>
+            </a:pPr>
+            <a:r>
+              <a:rPr lang="en-US" altLang="zh-CN" sz="1700" dirty="0">
+                <a:solidFill>
+                  <a:srgbClr val="4D646F"/>
+                </a:solidFill>
+              </a:rPr>
+              <a:t>precedence = (</a:t>
+            </a:r>
+          </a:p>
+          <a:p>
+            <a:pPr marL="0" indent="0">
+              <a:buNone/>
+            </a:pPr>
+            <a:r>
+              <a:rPr lang="en-US" altLang="zh-CN" sz="1700" dirty="0">
+                <a:solidFill>
+                  <a:srgbClr val="4D646F"/>
+                </a:solidFill>
+              </a:rPr>
+              <a:t>    ('left', 'ADD', 'SUBTRACT'),</a:t>
+            </a:r>
+          </a:p>
+          <a:p>
+            <a:pPr marL="0" indent="0">
+              <a:buNone/>
+            </a:pPr>
+            <a:r>
+              <a:rPr lang="en-US" altLang="zh-CN" sz="1700" dirty="0">
+                <a:solidFill>
+                  <a:srgbClr val="4D646F"/>
+                </a:solidFill>
+              </a:rPr>
+              <a:t>    ('left', 'MUL', 'DIV', '</a:t>
+            </a:r>
+            <a:r>
+              <a:rPr lang="en-US" altLang="zh-CN" sz="1700" dirty="0" err="1">
+                <a:solidFill>
+                  <a:srgbClr val="4D646F"/>
+                </a:solidFill>
+              </a:rPr>
+              <a:t>kDIV</a:t>
+            </a:r>
+            <a:r>
+              <a:rPr lang="en-US" altLang="zh-CN" sz="1700" dirty="0">
+                <a:solidFill>
+                  <a:srgbClr val="4D646F"/>
+                </a:solidFill>
+              </a:rPr>
+              <a:t>', '</a:t>
+            </a:r>
+            <a:r>
+              <a:rPr lang="en-US" altLang="zh-CN" sz="1700" dirty="0" err="1">
+                <a:solidFill>
+                  <a:srgbClr val="4D646F"/>
+                </a:solidFill>
+              </a:rPr>
+              <a:t>kMOD</a:t>
+            </a:r>
+            <a:r>
+              <a:rPr lang="en-US" altLang="zh-CN" sz="1700" dirty="0">
+                <a:solidFill>
+                  <a:srgbClr val="4D646F"/>
+                </a:solidFill>
+              </a:rPr>
+              <a:t>')</a:t>
+            </a:r>
+          </a:p>
+          <a:p>
+            <a:pPr marL="0" indent="0">
+              <a:buNone/>
+            </a:pPr>
+            <a:r>
+              <a:rPr lang="en-US" altLang="zh-CN" sz="1700" dirty="0">
+                <a:solidFill>
+                  <a:srgbClr val="4D646F"/>
+                </a:solidFill>
+              </a:rPr>
+              <a:t>)</a:t>
+            </a:r>
+          </a:p>
+        </p:txBody>
+      </p:sp>
+      <p:sp>
+        <p:nvSpPr>
+          <p:cNvPr id="10" name="圆角矩形 15">
+            <a:extLst>
+              <a:ext uri="{FF2B5EF4-FFF2-40B4-BE49-F238E27FC236}">
+                <a16:creationId xmlns:a16="http://schemas.microsoft.com/office/drawing/2014/main" id="{C6CADC8E-683B-463C-A2A0-374F4457E82A}"/>
+              </a:ext>
+            </a:extLst>
+          </p:cNvPr>
+          <p:cNvSpPr/>
+          <p:nvPr/>
+        </p:nvSpPr>
+        <p:spPr>
+          <a:xfrm>
+            <a:off x="591811" y="4016296"/>
+            <a:ext cx="114563" cy="603271"/>
+          </a:xfrm>
+          <a:prstGeom prst="roundRect">
+            <a:avLst/>
+          </a:prstGeom>
+          <a:solidFill>
+            <a:srgbClr val="9D9A88"/>
+          </a:solidFill>
+          <a:ln>
+            <a:noFill/>
+          </a:ln>
+        </p:spPr>
+        <p:style>
+          <a:lnRef idx="2">
+            <a:schemeClr val="accent1">
+              <a:shade val="50000"/>
+            </a:schemeClr>
+          </a:lnRef>
+          <a:fillRef idx="1">
+            <a:schemeClr val="accent1"/>
+          </a:fillRef>
+          <a:effectRef idx="0">
+            <a:schemeClr val="accent1"/>
+          </a:effectRef>
+          <a:fontRef idx="minor">
+            <a:schemeClr val="lt1"/>
+          </a:fontRef>
+        </p:style>
+        <p:txBody>
+          <a:bodyPr rtlCol="0" anchor="ctr"/>
+          <a:lstStyle/>
+          <a:p>
+            <a:pPr algn="ctr"/>
+            <a:endParaRPr lang="zh-CN" altLang="en-US" sz="1350">
+              <a:solidFill>
+                <a:srgbClr val="9D9A88"/>
+              </a:solidFill>
+            </a:endParaRPr>
+          </a:p>
+        </p:txBody>
+      </p:sp>
     </p:spTree>
   </p:cSld>
   <p:clrMapOvr>
@@ -11648,57 +14350,7 @@
         </p:nvSpPr>
         <p:spPr>
           <a:xfrm>
-            <a:off x="591812" y="1467706"/>
-            <a:ext cx="114563" cy="603271"/>
-          </a:xfrm>
-          <a:prstGeom prst="roundRect">
-            <a:avLst/>
-          </a:prstGeom>
-          <a:solidFill>
-            <a:srgbClr val="9D9A88"/>
-          </a:solidFill>
-          <a:ln>
-            <a:noFill/>
-          </a:ln>
-        </p:spPr>
-        <p:style>
-          <a:lnRef idx="2">
-            <a:schemeClr val="accent1">
-              <a:shade val="50000"/>
-            </a:schemeClr>
-          </a:lnRef>
-          <a:fillRef idx="1">
-            <a:schemeClr val="accent1"/>
-          </a:fillRef>
-          <a:effectRef idx="0">
-            <a:schemeClr val="accent1"/>
-          </a:effectRef>
-          <a:fontRef idx="minor">
-            <a:schemeClr val="lt1"/>
-          </a:fontRef>
-        </p:style>
-        <p:txBody>
-          <a:bodyPr rtlCol="0" anchor="ctr"/>
-          <a:lstStyle/>
-          <a:p>
-            <a:pPr algn="ctr"/>
-            <a:endParaRPr lang="zh-CN" altLang="en-US" sz="1350">
-              <a:solidFill>
-                <a:srgbClr val="9D9A88"/>
-              </a:solidFill>
-            </a:endParaRPr>
-          </a:p>
-        </p:txBody>
-      </p:sp>
-      <p:sp>
-        <p:nvSpPr>
-          <p:cNvPr id="17" name="圆角矩形 16"/>
-          <p:cNvSpPr/>
-          <p:nvPr/>
-        </p:nvSpPr>
-        <p:spPr>
-          <a:xfrm>
-            <a:off x="610182" y="3495823"/>
+            <a:off x="571778" y="2215002"/>
             <a:ext cx="114563" cy="603271"/>
           </a:xfrm>
           <a:prstGeom prst="roundRect">
@@ -11797,7 +14449,13 @@
       </p:sp>
       <p:sp>
         <p:nvSpPr>
-          <p:cNvPr id="18" name="内容占位符 2"/>
+          <p:cNvPr id="8" name="内容占位符 2">
+            <a:extLst>
+              <a:ext uri="{FF2B5EF4-FFF2-40B4-BE49-F238E27FC236}">
+                <a16:creationId xmlns:a16="http://schemas.microsoft.com/office/drawing/2014/main" id="{9C66530C-5C53-4209-8CE1-C3EBE420C407}"/>
+              </a:ext>
+            </a:extLst>
+          </p:cNvPr>
           <p:cNvSpPr>
             <a:spLocks noGrp="1"/>
           </p:cNvSpPr>
@@ -11805,8 +14463,8 @@
         </p:nvSpPr>
         <p:spPr>
           <a:xfrm>
-            <a:off x="784293" y="1356781"/>
-            <a:ext cx="3447239" cy="2407823"/>
+            <a:off x="724745" y="1356781"/>
+            <a:ext cx="6111990" cy="4916428"/>
           </a:xfrm>
           <a:prstGeom prst="rect">
             <a:avLst/>
@@ -11982,440 +14640,32 @@
           </a:lstStyle>
           <a:p>
             <a:r>
-              <a:rPr lang="en-US" altLang="zh-CN" sz="2100" b="1" dirty="0">
+              <a:rPr lang="en-US" altLang="zh-CN" sz="2600" b="1" dirty="0">
                 <a:solidFill>
                   <a:srgbClr val="4D646F"/>
                 </a:solidFill>
-                <a:sym typeface="+mn-ea"/>
-              </a:rPr>
-              <a:t>Ambiguity</a:t>
-            </a:r>
-          </a:p>
-          <a:p>
-            <a:pPr marL="0" indent="0">
-              <a:buNone/>
-            </a:pPr>
-            <a:r>
-              <a:rPr lang="en-US" altLang="zh-CN" sz="1700" dirty="0">
-                <a:solidFill>
-                  <a:srgbClr val="4D646F"/>
-                </a:solidFill>
-              </a:rPr>
-              <a:t>precedence = (</a:t>
-            </a:r>
-          </a:p>
-          <a:p>
-            <a:pPr marL="0" indent="0">
-              <a:buNone/>
-            </a:pPr>
-            <a:r>
-              <a:rPr lang="en-US" altLang="zh-CN" sz="1700" dirty="0">
-                <a:solidFill>
-                  <a:srgbClr val="4D646F"/>
-                </a:solidFill>
-              </a:rPr>
-              <a:t>    ('left', 'ADD', 'SUBTRACT'),</a:t>
-            </a:r>
-          </a:p>
-          <a:p>
-            <a:pPr marL="0" indent="0">
-              <a:buNone/>
-            </a:pPr>
-            <a:r>
-              <a:rPr lang="en-US" altLang="zh-CN" sz="1700" dirty="0">
-                <a:solidFill>
-                  <a:srgbClr val="4D646F"/>
-                </a:solidFill>
-              </a:rPr>
-              <a:t>    ('left', 'MUL', 'DIV', '</a:t>
-            </a:r>
-            <a:r>
-              <a:rPr lang="en-US" altLang="zh-CN" sz="1700" dirty="0" err="1">
-                <a:solidFill>
-                  <a:srgbClr val="4D646F"/>
-                </a:solidFill>
-              </a:rPr>
-              <a:t>kDIV</a:t>
-            </a:r>
-            <a:r>
-              <a:rPr lang="en-US" altLang="zh-CN" sz="1700" dirty="0">
-                <a:solidFill>
-                  <a:srgbClr val="4D646F"/>
-                </a:solidFill>
-              </a:rPr>
-              <a:t>', '</a:t>
-            </a:r>
-            <a:r>
-              <a:rPr lang="en-US" altLang="zh-CN" sz="1700" dirty="0" err="1">
-                <a:solidFill>
-                  <a:srgbClr val="4D646F"/>
-                </a:solidFill>
-              </a:rPr>
-              <a:t>kMOD</a:t>
-            </a:r>
-            <a:r>
-              <a:rPr lang="en-US" altLang="zh-CN" sz="1700" dirty="0">
-                <a:solidFill>
-                  <a:srgbClr val="4D646F"/>
-                </a:solidFill>
-              </a:rPr>
-              <a:t>')</a:t>
-            </a:r>
-          </a:p>
-          <a:p>
-            <a:pPr marL="0" indent="0">
-              <a:buNone/>
-            </a:pPr>
-            <a:r>
-              <a:rPr lang="en-US" altLang="zh-CN" sz="1700" dirty="0">
-                <a:solidFill>
-                  <a:srgbClr val="4D646F"/>
-                </a:solidFill>
-              </a:rPr>
-              <a:t>)</a:t>
-            </a:r>
-          </a:p>
-        </p:txBody>
-      </p:sp>
-      <p:sp>
-        <p:nvSpPr>
-          <p:cNvPr id="8" name="内容占位符 2">
-            <a:extLst>
-              <a:ext uri="{FF2B5EF4-FFF2-40B4-BE49-F238E27FC236}">
-                <a16:creationId xmlns:a16="http://schemas.microsoft.com/office/drawing/2014/main" id="{9C66530C-5C53-4209-8CE1-C3EBE420C407}"/>
-              </a:ext>
-            </a:extLst>
-          </p:cNvPr>
-          <p:cNvSpPr>
-            <a:spLocks noGrp="1"/>
-          </p:cNvSpPr>
-          <p:nvPr/>
-        </p:nvSpPr>
-        <p:spPr>
-          <a:xfrm>
-            <a:off x="784293" y="3294779"/>
-            <a:ext cx="8953191" cy="3526739"/>
-          </a:xfrm>
-          <a:prstGeom prst="rect">
-            <a:avLst/>
-          </a:prstGeom>
-        </p:spPr>
-        <p:txBody>
-          <a:bodyPr vert="horz" lIns="68580" tIns="34290" rIns="68580" bIns="34290" rtlCol="0">
-            <a:normAutofit/>
-          </a:bodyPr>
-          <a:lstStyle>
-            <a:lvl1pPr marL="228600" indent="-228600" algn="l" defTabSz="914400" rtl="0" eaLnBrk="1" latinLnBrk="0" hangingPunct="1">
-              <a:lnSpc>
-                <a:spcPct val="90000"/>
-              </a:lnSpc>
-              <a:spcBef>
-                <a:spcPts val="1000"/>
-              </a:spcBef>
-              <a:buFont typeface="Arial" panose="020B0604020202020204" pitchFamily="34" charset="0"/>
-              <a:buChar char="•"/>
-              <a:defRPr sz="2800" kern="1200">
-                <a:solidFill>
-                  <a:schemeClr val="tx1"/>
-                </a:solidFill>
-                <a:latin typeface="+mn-lt"/>
-                <a:ea typeface="+mn-ea"/>
-                <a:cs typeface="+mn-cs"/>
-              </a:defRPr>
-            </a:lvl1pPr>
-            <a:lvl2pPr marL="685800" indent="-228600" algn="l" defTabSz="914400" rtl="0" eaLnBrk="1" latinLnBrk="0" hangingPunct="1">
-              <a:lnSpc>
-                <a:spcPct val="90000"/>
-              </a:lnSpc>
-              <a:spcBef>
-                <a:spcPts val="500"/>
-              </a:spcBef>
-              <a:buFont typeface="Arial" panose="020B0604020202020204" pitchFamily="34" charset="0"/>
-              <a:buChar char="•"/>
-              <a:defRPr sz="2400" kern="1200">
-                <a:solidFill>
-                  <a:schemeClr val="tx1"/>
-                </a:solidFill>
-                <a:latin typeface="+mn-lt"/>
-                <a:ea typeface="+mn-ea"/>
-                <a:cs typeface="+mn-cs"/>
-              </a:defRPr>
-            </a:lvl2pPr>
-            <a:lvl3pPr marL="1143000" indent="-228600" algn="l" defTabSz="914400" rtl="0" eaLnBrk="1" latinLnBrk="0" hangingPunct="1">
-              <a:lnSpc>
-                <a:spcPct val="90000"/>
-              </a:lnSpc>
-              <a:spcBef>
-                <a:spcPts val="500"/>
-              </a:spcBef>
-              <a:buFont typeface="Arial" panose="020B0604020202020204" pitchFamily="34" charset="0"/>
-              <a:buChar char="•"/>
-              <a:defRPr sz="2000" kern="1200">
-                <a:solidFill>
-                  <a:schemeClr val="tx1"/>
-                </a:solidFill>
-                <a:latin typeface="+mn-lt"/>
-                <a:ea typeface="+mn-ea"/>
-                <a:cs typeface="+mn-cs"/>
-              </a:defRPr>
-            </a:lvl3pPr>
-            <a:lvl4pPr marL="1600200" indent="-228600" algn="l" defTabSz="914400" rtl="0" eaLnBrk="1" latinLnBrk="0" hangingPunct="1">
-              <a:lnSpc>
-                <a:spcPct val="90000"/>
-              </a:lnSpc>
-              <a:spcBef>
-                <a:spcPts val="500"/>
-              </a:spcBef>
-              <a:buFont typeface="Arial" panose="020B0604020202020204" pitchFamily="34" charset="0"/>
-              <a:buChar char="•"/>
-              <a:defRPr sz="1800" kern="1200">
-                <a:solidFill>
-                  <a:schemeClr val="tx1"/>
-                </a:solidFill>
-                <a:latin typeface="+mn-lt"/>
-                <a:ea typeface="+mn-ea"/>
-                <a:cs typeface="+mn-cs"/>
-              </a:defRPr>
-            </a:lvl4pPr>
-            <a:lvl5pPr marL="2057400" indent="-228600" algn="l" defTabSz="914400" rtl="0" eaLnBrk="1" latinLnBrk="0" hangingPunct="1">
-              <a:lnSpc>
-                <a:spcPct val="90000"/>
-              </a:lnSpc>
-              <a:spcBef>
-                <a:spcPts val="500"/>
-              </a:spcBef>
-              <a:buFont typeface="Arial" panose="020B0604020202020204" pitchFamily="34" charset="0"/>
-              <a:buChar char="•"/>
-              <a:defRPr sz="1800" kern="1200">
-                <a:solidFill>
-                  <a:schemeClr val="tx1"/>
-                </a:solidFill>
-                <a:latin typeface="+mn-lt"/>
-                <a:ea typeface="+mn-ea"/>
-                <a:cs typeface="+mn-cs"/>
-              </a:defRPr>
-            </a:lvl5pPr>
-            <a:lvl6pPr marL="2514600" indent="-228600" algn="l" defTabSz="914400" rtl="0" eaLnBrk="1" latinLnBrk="0" hangingPunct="1">
-              <a:lnSpc>
-                <a:spcPct val="90000"/>
-              </a:lnSpc>
-              <a:spcBef>
-                <a:spcPts val="500"/>
-              </a:spcBef>
-              <a:buFont typeface="Arial" panose="020B0604020202020204" pitchFamily="34" charset="0"/>
-              <a:buChar char="•"/>
-              <a:defRPr sz="1800" kern="1200">
-                <a:solidFill>
-                  <a:schemeClr val="tx1"/>
-                </a:solidFill>
-                <a:latin typeface="+mn-lt"/>
-                <a:ea typeface="+mn-ea"/>
-                <a:cs typeface="+mn-cs"/>
-              </a:defRPr>
-            </a:lvl6pPr>
-            <a:lvl7pPr marL="2971800" indent="-228600" algn="l" defTabSz="914400" rtl="0" eaLnBrk="1" latinLnBrk="0" hangingPunct="1">
-              <a:lnSpc>
-                <a:spcPct val="90000"/>
-              </a:lnSpc>
-              <a:spcBef>
-                <a:spcPts val="500"/>
-              </a:spcBef>
-              <a:buFont typeface="Arial" panose="020B0604020202020204" pitchFamily="34" charset="0"/>
-              <a:buChar char="•"/>
-              <a:defRPr sz="1800" kern="1200">
-                <a:solidFill>
-                  <a:schemeClr val="tx1"/>
-                </a:solidFill>
-                <a:latin typeface="+mn-lt"/>
-                <a:ea typeface="+mn-ea"/>
-                <a:cs typeface="+mn-cs"/>
-              </a:defRPr>
-            </a:lvl7pPr>
-            <a:lvl8pPr marL="3429000" indent="-228600" algn="l" defTabSz="914400" rtl="0" eaLnBrk="1" latinLnBrk="0" hangingPunct="1">
-              <a:lnSpc>
-                <a:spcPct val="90000"/>
-              </a:lnSpc>
-              <a:spcBef>
-                <a:spcPts val="500"/>
-              </a:spcBef>
-              <a:buFont typeface="Arial" panose="020B0604020202020204" pitchFamily="34" charset="0"/>
-              <a:buChar char="•"/>
-              <a:defRPr sz="1800" kern="1200">
-                <a:solidFill>
-                  <a:schemeClr val="tx1"/>
-                </a:solidFill>
-                <a:latin typeface="+mn-lt"/>
-                <a:ea typeface="+mn-ea"/>
-                <a:cs typeface="+mn-cs"/>
-              </a:defRPr>
-            </a:lvl8pPr>
-            <a:lvl9pPr marL="3886200" indent="-228600" algn="l" defTabSz="914400" rtl="0" eaLnBrk="1" latinLnBrk="0" hangingPunct="1">
-              <a:lnSpc>
-                <a:spcPct val="90000"/>
-              </a:lnSpc>
-              <a:spcBef>
-                <a:spcPts val="500"/>
-              </a:spcBef>
-              <a:buFont typeface="Arial" panose="020B0604020202020204" pitchFamily="34" charset="0"/>
-              <a:buChar char="•"/>
-              <a:defRPr sz="1800" kern="1200">
-                <a:solidFill>
-                  <a:schemeClr val="tx1"/>
-                </a:solidFill>
-                <a:latin typeface="+mn-lt"/>
-                <a:ea typeface="+mn-ea"/>
-                <a:cs typeface="+mn-cs"/>
-              </a:defRPr>
-            </a:lvl9pPr>
-          </a:lstStyle>
-          <a:p>
-            <a:r>
-              <a:rPr lang="en-US" altLang="zh-CN" sz="2100" b="1" dirty="0">
-                <a:solidFill>
-                  <a:srgbClr val="4D646F"/>
-                </a:solidFill>
               </a:rPr>
               <a:t>Error handling</a:t>
             </a:r>
           </a:p>
           <a:p>
-            <a:pPr marL="0" indent="0">
-              <a:buNone/>
-            </a:pPr>
-            <a:r>
-              <a:rPr lang="en-US" altLang="zh-CN" sz="1700" dirty="0">
-                <a:solidFill>
-                  <a:srgbClr val="4D646F"/>
-                </a:solidFill>
-              </a:rPr>
-              <a:t>def </a:t>
-            </a:r>
-            <a:r>
-              <a:rPr lang="en-US" altLang="zh-CN" sz="1700" dirty="0" err="1">
-                <a:solidFill>
-                  <a:srgbClr val="4D646F"/>
-                </a:solidFill>
-              </a:rPr>
-              <a:t>p_const_expr</a:t>
-            </a:r>
-            <a:r>
-              <a:rPr lang="en-US" altLang="zh-CN" sz="1700" dirty="0">
-                <a:solidFill>
-                  <a:srgbClr val="4D646F"/>
-                </a:solidFill>
-              </a:rPr>
-              <a:t>(p):</a:t>
-            </a:r>
-          </a:p>
-          <a:p>
-            <a:pPr marL="0" indent="0">
-              <a:buNone/>
-            </a:pPr>
-            <a:r>
-              <a:rPr lang="en-US" altLang="zh-CN" sz="1700" dirty="0">
-                <a:solidFill>
-                  <a:srgbClr val="4D646F"/>
-                </a:solidFill>
-              </a:rPr>
-              <a:t>    '</a:t>
-            </a:r>
-            <a:r>
-              <a:rPr lang="en-US" altLang="zh-CN" sz="1700" dirty="0" err="1">
-                <a:solidFill>
-                  <a:srgbClr val="4D646F"/>
-                </a:solidFill>
-              </a:rPr>
-              <a:t>const_expr</a:t>
-            </a:r>
-            <a:r>
-              <a:rPr lang="en-US" altLang="zh-CN" sz="1700" dirty="0">
-                <a:solidFill>
-                  <a:srgbClr val="4D646F"/>
-                </a:solidFill>
-              </a:rPr>
-              <a:t> : ID EQUAL </a:t>
-            </a:r>
-            <a:r>
-              <a:rPr lang="en-US" altLang="zh-CN" sz="1700" dirty="0" err="1">
-                <a:solidFill>
-                  <a:srgbClr val="4D646F"/>
-                </a:solidFill>
-              </a:rPr>
-              <a:t>const_value</a:t>
-            </a:r>
-            <a:r>
-              <a:rPr lang="en-US" altLang="zh-CN" sz="1700" dirty="0">
-                <a:solidFill>
-                  <a:srgbClr val="4D646F"/>
-                </a:solidFill>
-              </a:rPr>
-              <a:t> SEMICON'</a:t>
-            </a:r>
-          </a:p>
-          <a:p>
-            <a:pPr marL="0" indent="0">
-              <a:buNone/>
-            </a:pPr>
-            <a:r>
-              <a:rPr lang="en-US" altLang="zh-CN" sz="1700" dirty="0">
-                <a:solidFill>
-                  <a:srgbClr val="4D646F"/>
-                </a:solidFill>
-              </a:rPr>
-              <a:t>    p[0] = Node('</a:t>
-            </a:r>
-            <a:r>
-              <a:rPr lang="en-US" altLang="zh-CN" sz="1700" dirty="0" err="1">
-                <a:solidFill>
-                  <a:srgbClr val="4D646F"/>
-                </a:solidFill>
-              </a:rPr>
-              <a:t>const_expr</a:t>
-            </a:r>
-            <a:r>
-              <a:rPr lang="en-US" altLang="zh-CN" sz="1700" dirty="0">
-                <a:solidFill>
-                  <a:srgbClr val="4D646F"/>
-                </a:solidFill>
-              </a:rPr>
-              <a:t>', </a:t>
-            </a:r>
-            <a:r>
-              <a:rPr lang="en-US" altLang="zh-CN" sz="1700" dirty="0" err="1">
-                <a:solidFill>
-                  <a:srgbClr val="4D646F"/>
-                </a:solidFill>
-              </a:rPr>
-              <a:t>p.lexer.lineno</a:t>
-            </a:r>
-            <a:r>
-              <a:rPr lang="en-US" altLang="zh-CN" sz="1700" dirty="0">
-                <a:solidFill>
-                  <a:srgbClr val="4D646F"/>
-                </a:solidFill>
-              </a:rPr>
-              <a:t>, p[1], p[3])</a:t>
-            </a:r>
-          </a:p>
-          <a:p>
-            <a:pPr marL="0" indent="0">
-              <a:buNone/>
-            </a:pPr>
-            <a:r>
-              <a:rPr lang="en-US" altLang="zh-CN" sz="1700" dirty="0">
-                <a:solidFill>
-                  <a:srgbClr val="4D646F"/>
-                </a:solidFill>
-              </a:rPr>
-              <a:t>    </a:t>
-            </a:r>
-            <a:endParaRPr lang="zh-CN" altLang="en-US" sz="1700" dirty="0">
+            <a:endParaRPr lang="en-US" altLang="zh-CN" sz="1400" b="1" dirty="0">
               <a:solidFill>
                 <a:srgbClr val="4D646F"/>
               </a:solidFill>
             </a:endParaRPr>
           </a:p>
           <a:p>
+            <a:r>
+              <a:rPr lang="en-US" altLang="zh-CN" sz="2100" b="1" dirty="0">
+                <a:solidFill>
+                  <a:srgbClr val="4D646F"/>
+                </a:solidFill>
+              </a:rPr>
+              <a:t>Panic mode</a:t>
+            </a:r>
+          </a:p>
+          <a:p>
             <a:pPr marL="0" indent="0">
               <a:buNone/>
             </a:pPr>
@@ -12433,7 +14683,7 @@
                   <a:srgbClr val="4D646F"/>
                 </a:solidFill>
               </a:rPr>
-              <a:t>p_const_expr_error</a:t>
+              <a:t>p_error</a:t>
             </a:r>
             <a:r>
               <a:rPr lang="en-US" altLang="zh-CN" sz="1700" dirty="0">
@@ -12454,23 +14704,7 @@
                   <a:srgbClr val="4D646F"/>
                 </a:solidFill>
               </a:rPr>
-              <a:t>    '</a:t>
-            </a:r>
-            <a:r>
-              <a:rPr lang="en-US" altLang="zh-CN" sz="1700" dirty="0" err="1">
-                <a:solidFill>
-                  <a:srgbClr val="4D646F"/>
-                </a:solidFill>
-              </a:rPr>
-              <a:t>const_expr</a:t>
-            </a:r>
-            <a:r>
-              <a:rPr lang="en-US" altLang="zh-CN" sz="1700" dirty="0">
-                <a:solidFill>
-                  <a:srgbClr val="4D646F"/>
-                </a:solidFill>
-              </a:rPr>
-              <a:t> :  error  SEMICON'</a:t>
+              <a:t>    if p:</a:t>
             </a:r>
           </a:p>
           <a:p>
@@ -12483,7 +14717,7 @@
                   <a:srgbClr val="4D646F"/>
                 </a:solidFill>
               </a:rPr>
-              <a:t>    </a:t>
+              <a:t>        </a:t>
             </a:r>
             <a:r>
               <a:rPr lang="en-US" altLang="zh-CN" sz="1700" dirty="0" err="1">
@@ -12499,7 +14733,7 @@
                   <a:srgbClr val="4D646F"/>
                 </a:solidFill>
               </a:rPr>
-              <a:t>(p[1].</a:t>
+              <a:t>(</a:t>
             </a:r>
             <a:r>
               <a:rPr lang="en-US" altLang="zh-CN" sz="1700" dirty="0" err="1">
@@ -12507,7 +14741,7 @@
                   <a:srgbClr val="4D646F"/>
                 </a:solidFill>
               </a:rPr>
-              <a:t>lineno</a:t>
+              <a:t>p.lineno</a:t>
             </a:r>
             <a:r>
               <a:rPr lang="en-US" altLang="zh-CN" sz="1700" dirty="0">
@@ -12528,7 +14762,7 @@
                   <a:srgbClr val="4D646F"/>
                 </a:solidFill>
               </a:rPr>
-              <a:t>                </a:t>
+              <a:t>                             "syntax error at token {}".format(</a:t>
             </a:r>
             <a:r>
               <a:rPr lang="en-US" altLang="zh-CN" sz="1700" dirty="0" err="1">
@@ -12536,7 +14770,7 @@
                   <a:srgbClr val="4D646F"/>
                 </a:solidFill>
               </a:rPr>
-              <a:t>f"Syntax</a:t>
+              <a:t>p.value</a:t>
             </a:r>
             <a:r>
               <a:rPr lang="en-US" altLang="zh-CN" sz="1700" dirty="0">
@@ -12544,7 +14778,75 @@
                   <a:srgbClr val="4D646F"/>
                 </a:solidFill>
               </a:rPr>
-              <a:t> error at token `{p[1].value}`in const expression.")</a:t>
+              <a:t>))</a:t>
+            </a:r>
+          </a:p>
+          <a:p>
+            <a:pPr marL="0" indent="0">
+              <a:buNone/>
+            </a:pPr>
+            <a:r>
+              <a:rPr lang="en-US" altLang="zh-CN" sz="1700" dirty="0">
+                <a:solidFill>
+                  <a:srgbClr val="4D646F"/>
+                </a:solidFill>
+              </a:rPr>
+              <a:t>        # Just discard the token and tell the parser it's okay.</a:t>
+            </a:r>
+          </a:p>
+          <a:p>
+            <a:pPr marL="0" indent="0">
+              <a:buNone/>
+            </a:pPr>
+            <a:r>
+              <a:rPr lang="en-US" altLang="zh-CN" sz="1700" dirty="0">
+                <a:solidFill>
+                  <a:srgbClr val="4D646F"/>
+                </a:solidFill>
+              </a:rPr>
+              <a:t>        </a:t>
+            </a:r>
+            <a:r>
+              <a:rPr lang="en-US" altLang="zh-CN" sz="1700" dirty="0" err="1">
+                <a:solidFill>
+                  <a:srgbClr val="4D646F"/>
+                </a:solidFill>
+              </a:rPr>
+              <a:t>parser.errok</a:t>
+            </a:r>
+            <a:r>
+              <a:rPr lang="en-US" altLang="zh-CN" sz="1700" dirty="0">
+                <a:solidFill>
+                  <a:srgbClr val="4D646F"/>
+                </a:solidFill>
+              </a:rPr>
+              <a:t>()</a:t>
+            </a:r>
+          </a:p>
+          <a:p>
+            <a:pPr marL="0" indent="0">
+              <a:buNone/>
+            </a:pPr>
+            <a:r>
+              <a:rPr lang="en-US" altLang="zh-CN" sz="1700" dirty="0">
+                <a:solidFill>
+                  <a:srgbClr val="4D646F"/>
+                </a:solidFill>
+              </a:rPr>
+              <a:t>    else:</a:t>
+            </a:r>
+          </a:p>
+          <a:p>
+            <a:pPr marL="0" indent="0">
+              <a:buNone/>
+            </a:pPr>
+            <a:r>
+              <a:rPr lang="en-US" altLang="zh-CN" sz="1700" dirty="0">
+                <a:solidFill>
+                  <a:srgbClr val="4D646F"/>
+                </a:solidFill>
+              </a:rPr>
+              <a:t>        print("Syntax error at EOF")</a:t>
             </a:r>
           </a:p>
         </p:txBody>
@@ -12633,57 +14935,7 @@
         </p:nvSpPr>
         <p:spPr>
           <a:xfrm>
-            <a:off x="591812" y="1467706"/>
-            <a:ext cx="114563" cy="603271"/>
-          </a:xfrm>
-          <a:prstGeom prst="roundRect">
-            <a:avLst/>
-          </a:prstGeom>
-          <a:solidFill>
-            <a:srgbClr val="9D9A88"/>
-          </a:solidFill>
-          <a:ln>
-            <a:noFill/>
-          </a:ln>
-        </p:spPr>
-        <p:style>
-          <a:lnRef idx="2">
-            <a:schemeClr val="accent1">
-              <a:shade val="50000"/>
-            </a:schemeClr>
-          </a:lnRef>
-          <a:fillRef idx="1">
-            <a:schemeClr val="accent1"/>
-          </a:fillRef>
-          <a:effectRef idx="0">
-            <a:schemeClr val="accent1"/>
-          </a:effectRef>
-          <a:fontRef idx="minor">
-            <a:schemeClr val="lt1"/>
-          </a:fontRef>
-        </p:style>
-        <p:txBody>
-          <a:bodyPr rtlCol="0" anchor="ctr"/>
-          <a:lstStyle/>
-          <a:p>
-            <a:pPr algn="ctr"/>
-            <a:endParaRPr lang="zh-CN" altLang="en-US" sz="1350">
-              <a:solidFill>
-                <a:srgbClr val="9D9A88"/>
-              </a:solidFill>
-            </a:endParaRPr>
-          </a:p>
-        </p:txBody>
-      </p:sp>
-      <p:sp>
-        <p:nvSpPr>
-          <p:cNvPr id="17" name="圆角矩形 16"/>
-          <p:cNvSpPr/>
-          <p:nvPr/>
-        </p:nvSpPr>
-        <p:spPr>
-          <a:xfrm>
-            <a:off x="591812" y="2825729"/>
+            <a:off x="591812" y="1933497"/>
             <a:ext cx="114563" cy="603271"/>
           </a:xfrm>
           <a:prstGeom prst="roundRect">
@@ -12775,14 +15027,20 @@
                 <a:ea typeface="+mn-ea"/>
                 <a:cs typeface="+mn-cs"/>
               </a:rPr>
-              <a:t>Semantic analysis</a:t>
+              <a:t>Grammar analysis</a:t>
             </a:r>
           </a:p>
         </p:txBody>
       </p:sp>
       <p:sp>
         <p:nvSpPr>
-          <p:cNvPr id="18" name="内容占位符 2"/>
+          <p:cNvPr id="8" name="内容占位符 2">
+            <a:extLst>
+              <a:ext uri="{FF2B5EF4-FFF2-40B4-BE49-F238E27FC236}">
+                <a16:creationId xmlns:a16="http://schemas.microsoft.com/office/drawing/2014/main" id="{9C66530C-5C53-4209-8CE1-C3EBE420C407}"/>
+              </a:ext>
+            </a:extLst>
+          </p:cNvPr>
           <p:cNvSpPr>
             <a:spLocks noGrp="1"/>
           </p:cNvSpPr>
@@ -12790,8 +15048,8 @@
         </p:nvSpPr>
         <p:spPr>
           <a:xfrm>
-            <a:off x="784293" y="1356781"/>
-            <a:ext cx="3447239" cy="2407823"/>
+            <a:off x="724745" y="1356781"/>
+            <a:ext cx="6430967" cy="4469861"/>
           </a:xfrm>
           <a:prstGeom prst="rect">
             <a:avLst/>
@@ -12967,31 +15225,313 @@
           </a:lstStyle>
           <a:p>
             <a:r>
-              <a:rPr lang="en-US" altLang="zh-CN" sz="2100" b="1" dirty="0">
+              <a:rPr lang="en-US" altLang="zh-CN" sz="2600" b="1" dirty="0">
                 <a:solidFill>
                   <a:srgbClr val="4D646F"/>
                 </a:solidFill>
-                <a:sym typeface="+mn-ea"/>
-              </a:rPr>
-              <a:t>More</a:t>
-            </a:r>
-          </a:p>
-          <a:p>
-            <a:pPr marL="0" indent="0">
-              <a:buNone/>
-            </a:pPr>
-            <a:endParaRPr lang="en-US" altLang="zh-CN" sz="1700" dirty="0">
+              </a:rPr>
+              <a:t>Error handling</a:t>
+            </a:r>
+          </a:p>
+          <a:p>
+            <a:endParaRPr lang="en-US" altLang="zh-CN" sz="1400" b="1" dirty="0">
               <a:solidFill>
                 <a:srgbClr val="4D646F"/>
               </a:solidFill>
             </a:endParaRPr>
+          </a:p>
+          <a:p>
+            <a:r>
+              <a:rPr lang="en-US" altLang="zh-CN" sz="2100" b="1" dirty="0">
+                <a:solidFill>
+                  <a:srgbClr val="4D646F"/>
+                </a:solidFill>
+              </a:rPr>
+              <a:t>resynchronization</a:t>
+            </a:r>
+          </a:p>
+          <a:p>
+            <a:endParaRPr lang="en-US" altLang="zh-CN" sz="2100" b="1" dirty="0">
+              <a:solidFill>
+                <a:srgbClr val="4D646F"/>
+              </a:solidFill>
+            </a:endParaRPr>
+          </a:p>
+          <a:p>
+            <a:pPr marL="0" indent="0">
+              <a:buNone/>
+            </a:pPr>
+            <a:r>
+              <a:rPr lang="en-US" altLang="zh-CN" sz="1700" dirty="0">
+                <a:solidFill>
+                  <a:srgbClr val="4D646F"/>
+                </a:solidFill>
+              </a:rPr>
+              <a:t>def </a:t>
+            </a:r>
+            <a:r>
+              <a:rPr lang="en-US" altLang="zh-CN" sz="1700" dirty="0" err="1">
+                <a:solidFill>
+                  <a:srgbClr val="4D646F"/>
+                </a:solidFill>
+              </a:rPr>
+              <a:t>p_const_expr</a:t>
+            </a:r>
+            <a:r>
+              <a:rPr lang="en-US" altLang="zh-CN" sz="1700" dirty="0">
+                <a:solidFill>
+                  <a:srgbClr val="4D646F"/>
+                </a:solidFill>
+              </a:rPr>
+              <a:t>(p):</a:t>
+            </a:r>
+          </a:p>
+          <a:p>
+            <a:pPr marL="0" indent="0">
+              <a:buNone/>
+            </a:pPr>
+            <a:r>
+              <a:rPr lang="en-US" altLang="zh-CN" sz="1700" dirty="0">
+                <a:solidFill>
+                  <a:srgbClr val="4D646F"/>
+                </a:solidFill>
+              </a:rPr>
+              <a:t>    '</a:t>
+            </a:r>
+            <a:r>
+              <a:rPr lang="en-US" altLang="zh-CN" sz="1700" dirty="0" err="1">
+                <a:solidFill>
+                  <a:srgbClr val="4D646F"/>
+                </a:solidFill>
+              </a:rPr>
+              <a:t>const_expr</a:t>
+            </a:r>
+            <a:r>
+              <a:rPr lang="en-US" altLang="zh-CN" sz="1700" dirty="0">
+                <a:solidFill>
+                  <a:srgbClr val="4D646F"/>
+                </a:solidFill>
+              </a:rPr>
+              <a:t> : ID EQUAL </a:t>
+            </a:r>
+            <a:r>
+              <a:rPr lang="en-US" altLang="zh-CN" sz="1700" dirty="0" err="1">
+                <a:solidFill>
+                  <a:srgbClr val="4D646F"/>
+                </a:solidFill>
+              </a:rPr>
+              <a:t>const_value</a:t>
+            </a:r>
+            <a:r>
+              <a:rPr lang="en-US" altLang="zh-CN" sz="1700" dirty="0">
+                <a:solidFill>
+                  <a:srgbClr val="4D646F"/>
+                </a:solidFill>
+              </a:rPr>
+              <a:t> SEMICON'</a:t>
+            </a:r>
+          </a:p>
+          <a:p>
+            <a:pPr marL="0" indent="0">
+              <a:buNone/>
+            </a:pPr>
+            <a:r>
+              <a:rPr lang="en-US" altLang="zh-CN" sz="1700" dirty="0">
+                <a:solidFill>
+                  <a:srgbClr val="4D646F"/>
+                </a:solidFill>
+              </a:rPr>
+              <a:t>    p[0] = Node('</a:t>
+            </a:r>
+            <a:r>
+              <a:rPr lang="en-US" altLang="zh-CN" sz="1700" dirty="0" err="1">
+                <a:solidFill>
+                  <a:srgbClr val="4D646F"/>
+                </a:solidFill>
+              </a:rPr>
+              <a:t>const_expr</a:t>
+            </a:r>
+            <a:r>
+              <a:rPr lang="en-US" altLang="zh-CN" sz="1700" dirty="0">
+                <a:solidFill>
+                  <a:srgbClr val="4D646F"/>
+                </a:solidFill>
+              </a:rPr>
+              <a:t>', </a:t>
+            </a:r>
+            <a:r>
+              <a:rPr lang="en-US" altLang="zh-CN" sz="1700" dirty="0" err="1">
+                <a:solidFill>
+                  <a:srgbClr val="4D646F"/>
+                </a:solidFill>
+              </a:rPr>
+              <a:t>p.lexer.lineno</a:t>
+            </a:r>
+            <a:r>
+              <a:rPr lang="en-US" altLang="zh-CN" sz="1700" dirty="0">
+                <a:solidFill>
+                  <a:srgbClr val="4D646F"/>
+                </a:solidFill>
+              </a:rPr>
+              <a:t>, p[1], p[3])</a:t>
+            </a:r>
+          </a:p>
+          <a:p>
+            <a:pPr marL="0" indent="0">
+              <a:buNone/>
+            </a:pPr>
+            <a:r>
+              <a:rPr lang="en-US" altLang="zh-CN" sz="1700" dirty="0">
+                <a:solidFill>
+                  <a:srgbClr val="4D646F"/>
+                </a:solidFill>
+              </a:rPr>
+              <a:t>    </a:t>
+            </a:r>
+            <a:endParaRPr lang="zh-CN" altLang="en-US" sz="1700" dirty="0">
+              <a:solidFill>
+                <a:srgbClr val="4D646F"/>
+              </a:solidFill>
+            </a:endParaRPr>
+          </a:p>
+          <a:p>
+            <a:pPr marL="0" indent="0">
+              <a:buNone/>
+            </a:pPr>
+            <a:r>
+              <a:rPr lang="en-US" altLang="zh-CN" sz="1700" dirty="0">
+                <a:solidFill>
+                  <a:srgbClr val="4D646F"/>
+                </a:solidFill>
+              </a:rPr>
+              <a:t>def </a:t>
+            </a:r>
+            <a:r>
+              <a:rPr lang="en-US" altLang="zh-CN" sz="1700" dirty="0" err="1">
+                <a:solidFill>
+                  <a:srgbClr val="4D646F"/>
+                </a:solidFill>
+              </a:rPr>
+              <a:t>p_const_expr_error</a:t>
+            </a:r>
+            <a:r>
+              <a:rPr lang="en-US" altLang="zh-CN" sz="1700" dirty="0">
+                <a:solidFill>
+                  <a:srgbClr val="4D646F"/>
+                </a:solidFill>
+              </a:rPr>
+              <a:t>(p):</a:t>
+            </a:r>
+          </a:p>
+          <a:p>
+            <a:pPr marL="0" indent="0">
+              <a:buNone/>
+            </a:pPr>
+            <a:r>
+              <a:rPr lang="en-US" altLang="zh-CN" sz="1700" dirty="0">
+                <a:solidFill>
+                  <a:srgbClr val="4D646F"/>
+                </a:solidFill>
+              </a:rPr>
+              <a:t>    '</a:t>
+            </a:r>
+            <a:r>
+              <a:rPr lang="en-US" altLang="zh-CN" sz="1700" dirty="0" err="1">
+                <a:solidFill>
+                  <a:srgbClr val="4D646F"/>
+                </a:solidFill>
+              </a:rPr>
+              <a:t>const_expr</a:t>
+            </a:r>
+            <a:r>
+              <a:rPr lang="en-US" altLang="zh-CN" sz="1700" dirty="0">
+                <a:solidFill>
+                  <a:srgbClr val="4D646F"/>
+                </a:solidFill>
+              </a:rPr>
+              <a:t> :  error  SEMICON'</a:t>
+            </a:r>
+          </a:p>
+          <a:p>
+            <a:pPr marL="0" indent="0">
+              <a:buNone/>
+            </a:pPr>
+            <a:r>
+              <a:rPr lang="en-US" altLang="zh-CN" sz="1700" dirty="0">
+                <a:solidFill>
+                  <a:srgbClr val="4D646F"/>
+                </a:solidFill>
+              </a:rPr>
+              <a:t>    </a:t>
+            </a:r>
+            <a:r>
+              <a:rPr lang="en-US" altLang="zh-CN" sz="1700" dirty="0" err="1">
+                <a:solidFill>
+                  <a:srgbClr val="4D646F"/>
+                </a:solidFill>
+              </a:rPr>
+              <a:t>SemanticLogger.error</a:t>
+            </a:r>
+            <a:r>
+              <a:rPr lang="en-US" altLang="zh-CN" sz="1700" dirty="0">
+                <a:solidFill>
+                  <a:srgbClr val="4D646F"/>
+                </a:solidFill>
+              </a:rPr>
+              <a:t>(p[1].</a:t>
+            </a:r>
+            <a:r>
+              <a:rPr lang="en-US" altLang="zh-CN" sz="1700" dirty="0" err="1">
+                <a:solidFill>
+                  <a:srgbClr val="4D646F"/>
+                </a:solidFill>
+              </a:rPr>
+              <a:t>lineno</a:t>
+            </a:r>
+            <a:r>
+              <a:rPr lang="en-US" altLang="zh-CN" sz="1700" dirty="0">
+                <a:solidFill>
+                  <a:srgbClr val="4D646F"/>
+                </a:solidFill>
+              </a:rPr>
+              <a:t>,</a:t>
+            </a:r>
+          </a:p>
+          <a:p>
+            <a:pPr marL="0" indent="0">
+              <a:buNone/>
+            </a:pPr>
+            <a:r>
+              <a:rPr lang="en-US" altLang="zh-CN" sz="1700" dirty="0">
+                <a:solidFill>
+                  <a:srgbClr val="4D646F"/>
+                </a:solidFill>
+              </a:rPr>
+              <a:t>                </a:t>
+            </a:r>
+            <a:r>
+              <a:rPr lang="en-US" altLang="zh-CN" sz="1700" dirty="0" err="1">
+                <a:solidFill>
+                  <a:srgbClr val="4D646F"/>
+                </a:solidFill>
+              </a:rPr>
+              <a:t>f"Syntax</a:t>
+            </a:r>
+            <a:r>
+              <a:rPr lang="en-US" altLang="zh-CN" sz="1700" dirty="0">
+                <a:solidFill>
+                  <a:srgbClr val="4D646F"/>
+                </a:solidFill>
+              </a:rPr>
+              <a:t> error at token `{p[1].value}`in const expression.")</a:t>
+            </a:r>
           </a:p>
         </p:txBody>
       </p:sp>
     </p:spTree>
     <p:extLst>
       <p:ext uri="{BB962C8B-B14F-4D97-AF65-F5344CB8AC3E}">
-        <p14:creationId xmlns:p14="http://schemas.microsoft.com/office/powerpoint/2010/main" val="4005512263"/>
+        <p14:creationId xmlns:p14="http://schemas.microsoft.com/office/powerpoint/2010/main" val="4079251871"/>
       </p:ext>
     </p:extLst>
   </p:cSld>

</xml_diff>